<commit_message>
:100: :+1: :-1:  Ja Ganhou :-1: :+1: :100:
Amazon Elastic Compute Cloud
</commit_message>
<xml_diff>
--- a/PPTESOF.pptx
+++ b/PPTESOF.pptx
@@ -11,9 +11,12 @@
     <p:sldId id="262" r:id="rId5"/>
     <p:sldId id="258" r:id="rId6"/>
     <p:sldId id="259" r:id="rId7"/>
-    <p:sldId id="260" r:id="rId8"/>
-    <p:sldId id="261" r:id="rId9"/>
-    <p:sldId id="264" r:id="rId10"/>
+    <p:sldId id="265" r:id="rId8"/>
+    <p:sldId id="266" r:id="rId9"/>
+    <p:sldId id="260" r:id="rId10"/>
+    <p:sldId id="261" r:id="rId11"/>
+    <p:sldId id="267" r:id="rId12"/>
+    <p:sldId id="264" r:id="rId13"/>
   </p:sldIdLst>
   <p:sldSz cx="12192000" cy="6858000"/>
   <p:notesSz cx="6858000" cy="9144000"/>
@@ -6153,1510 +6156,7 @@
 </p:sld>
 </file>
 
-<file path=ppt/slides/slide2.xml><?xml version="1.0" encoding="utf-8"?>
-<p:sld xmlns:a="http://schemas.openxmlformats.org/drawingml/2006/main" xmlns:r="http://schemas.openxmlformats.org/officeDocument/2006/relationships" xmlns:p="http://schemas.openxmlformats.org/presentationml/2006/main">
-  <p:cSld>
-    <p:spTree>
-      <p:nvGrpSpPr>
-        <p:cNvPr id="1" name=""/>
-        <p:cNvGrpSpPr/>
-        <p:nvPr/>
-      </p:nvGrpSpPr>
-      <p:grpSpPr>
-        <a:xfrm>
-          <a:off x="0" y="0"/>
-          <a:ext cx="0" cy="0"/>
-          <a:chOff x="0" y="0"/>
-          <a:chExt cx="0" cy="0"/>
-        </a:xfrm>
-      </p:grpSpPr>
-      <p:sp>
-        <p:nvSpPr>
-          <p:cNvPr id="2" name="Título 1"/>
-          <p:cNvSpPr>
-            <a:spLocks noGrp="1"/>
-          </p:cNvSpPr>
-          <p:nvPr>
-            <p:ph type="title"/>
-          </p:nvPr>
-        </p:nvSpPr>
-        <p:spPr/>
-        <p:txBody>
-          <a:bodyPr/>
-          <a:lstStyle/>
-          <a:p>
-            <a:pPr algn="ctr"/>
-            <a:r>
-              <a:rPr lang="pt-PT" dirty="0" err="1" smtClean="0"/>
-              <a:t>Why</a:t>
-            </a:r>
-            <a:r>
-              <a:rPr lang="pt-PT" dirty="0" smtClean="0"/>
-              <a:t> </a:t>
-            </a:r>
-            <a:r>
-              <a:rPr lang="pt-PT" dirty="0" err="1" smtClean="0"/>
-              <a:t>was</a:t>
-            </a:r>
-            <a:r>
-              <a:rPr lang="pt-PT" dirty="0" smtClean="0"/>
-              <a:t> </a:t>
-            </a:r>
-            <a:r>
-              <a:rPr lang="pt-PT" dirty="0" err="1" smtClean="0"/>
-              <a:t>MapReduce</a:t>
-            </a:r>
-            <a:r>
-              <a:rPr lang="pt-PT" dirty="0" smtClean="0"/>
-              <a:t> </a:t>
-            </a:r>
-            <a:r>
-              <a:rPr lang="pt-PT" dirty="0" err="1" smtClean="0"/>
-              <a:t>created</a:t>
-            </a:r>
-            <a:r>
-              <a:rPr lang="pt-PT" dirty="0" smtClean="0"/>
-              <a:t>?</a:t>
-            </a:r>
-            <a:endParaRPr lang="en-GB" dirty="0"/>
-          </a:p>
-        </p:txBody>
-      </p:sp>
-      <p:sp>
-        <p:nvSpPr>
-          <p:cNvPr id="7" name="Marcador de Posição de Conteúdo 6"/>
-          <p:cNvSpPr>
-            <a:spLocks noGrp="1"/>
-          </p:cNvSpPr>
-          <p:nvPr>
-            <p:ph idx="1"/>
-          </p:nvPr>
-        </p:nvSpPr>
-        <p:spPr/>
-        <p:txBody>
-          <a:bodyPr/>
-          <a:lstStyle/>
-          <a:p>
-            <a:r>
-              <a:rPr lang="en-GB" sz="1800" dirty="0"/>
-              <a:t>Large scale data processing was difficult! </a:t>
-            </a:r>
-            <a:endParaRPr lang="en-GB" sz="1800" dirty="0" smtClean="0"/>
-          </a:p>
-          <a:p>
-            <a:pPr lvl="1"/>
-            <a:r>
-              <a:rPr lang="en-GB" dirty="0" smtClean="0"/>
-              <a:t>Managing </a:t>
-            </a:r>
-            <a:r>
-              <a:rPr lang="en-GB" dirty="0"/>
-              <a:t>hundreds or thousands of processors </a:t>
-            </a:r>
-          </a:p>
-          <a:p>
-            <a:pPr lvl="1"/>
-            <a:r>
-              <a:rPr lang="en-GB" dirty="0"/>
-              <a:t>Managing parallelization and distribution </a:t>
-            </a:r>
-          </a:p>
-          <a:p>
-            <a:pPr lvl="1"/>
-            <a:r>
-              <a:rPr lang="en-GB" dirty="0"/>
-              <a:t>I/O Scheduling Status and monitoring </a:t>
-            </a:r>
-          </a:p>
-          <a:p>
-            <a:pPr lvl="1"/>
-            <a:r>
-              <a:rPr lang="en-GB" dirty="0" smtClean="0"/>
-              <a:t>Fault/crash tolerance</a:t>
-            </a:r>
-          </a:p>
-          <a:p>
-            <a:pPr lvl="1"/>
-            <a:endParaRPr lang="en-GB" dirty="0" smtClean="0"/>
-          </a:p>
-          <a:p>
-            <a:r>
-              <a:rPr lang="en-GB" sz="1800" dirty="0" err="1" smtClean="0"/>
-              <a:t>MapReduce</a:t>
-            </a:r>
-            <a:r>
-              <a:rPr lang="en-GB" sz="1800" dirty="0" smtClean="0"/>
-              <a:t> </a:t>
-            </a:r>
-            <a:r>
-              <a:rPr lang="en-GB" sz="1800" dirty="0"/>
-              <a:t>provides all of these, easily!</a:t>
-            </a:r>
-          </a:p>
-          <a:p>
-            <a:pPr lvl="1"/>
-            <a:endParaRPr lang="en-GB" dirty="0" smtClean="0"/>
-          </a:p>
-        </p:txBody>
-      </p:sp>
-      <p:pic>
-        <p:nvPicPr>
-          <p:cNvPr id="8" name="Imagem 7"/>
-          <p:cNvPicPr>
-            <a:picLocks noChangeAspect="1"/>
-          </p:cNvPicPr>
-          <p:nvPr/>
-        </p:nvPicPr>
-        <p:blipFill>
-          <a:blip r:embed="rId2">
-            <a:extLst>
-              <a:ext uri="{28A0092B-C50C-407E-A947-70E740481C1C}">
-                <a14:useLocalDpi xmlns:a14="http://schemas.microsoft.com/office/drawing/2010/main" val="0"/>
-              </a:ext>
-            </a:extLst>
-          </a:blip>
-          <a:stretch>
-            <a:fillRect/>
-          </a:stretch>
-        </p:blipFill>
-        <p:spPr>
-          <a:xfrm>
-            <a:off x="6753225" y="2923964"/>
-            <a:ext cx="4879975" cy="3663805"/>
-          </a:xfrm>
-          <a:prstGeom prst="rect">
-            <a:avLst/>
-          </a:prstGeom>
-        </p:spPr>
-      </p:pic>
-    </p:spTree>
-    <p:extLst>
-      <p:ext uri="{BB962C8B-B14F-4D97-AF65-F5344CB8AC3E}">
-        <p14:creationId xmlns:p14="http://schemas.microsoft.com/office/powerpoint/2010/main" val="1954382101"/>
-      </p:ext>
-    </p:extLst>
-  </p:cSld>
-  <p:clrMapOvr>
-    <a:masterClrMapping/>
-  </p:clrMapOvr>
-  <p:timing>
-    <p:tnLst>
-      <p:par>
-        <p:cTn id="1" dur="indefinite" restart="never" nodeType="tmRoot"/>
-      </p:par>
-    </p:tnLst>
-  </p:timing>
-</p:sld>
-</file>
-
-<file path=ppt/slides/slide3.xml><?xml version="1.0" encoding="utf-8"?>
-<p:sld xmlns:a="http://schemas.openxmlformats.org/drawingml/2006/main" xmlns:r="http://schemas.openxmlformats.org/officeDocument/2006/relationships" xmlns:p="http://schemas.openxmlformats.org/presentationml/2006/main">
-  <p:cSld>
-    <p:spTree>
-      <p:nvGrpSpPr>
-        <p:cNvPr id="1" name=""/>
-        <p:cNvGrpSpPr/>
-        <p:nvPr/>
-      </p:nvGrpSpPr>
-      <p:grpSpPr>
-        <a:xfrm>
-          <a:off x="0" y="0"/>
-          <a:ext cx="0" cy="0"/>
-          <a:chOff x="0" y="0"/>
-          <a:chExt cx="0" cy="0"/>
-        </a:xfrm>
-      </p:grpSpPr>
-      <p:sp>
-        <p:nvSpPr>
-          <p:cNvPr id="2" name="Título 1"/>
-          <p:cNvSpPr>
-            <a:spLocks noGrp="1"/>
-          </p:cNvSpPr>
-          <p:nvPr>
-            <p:ph type="title"/>
-          </p:nvPr>
-        </p:nvSpPr>
-        <p:spPr/>
-        <p:txBody>
-          <a:bodyPr/>
-          <a:lstStyle/>
-          <a:p>
-            <a:pPr algn="ctr"/>
-            <a:r>
-              <a:rPr lang="pt-PT" dirty="0" err="1" smtClean="0"/>
-              <a:t>What</a:t>
-            </a:r>
-            <a:r>
-              <a:rPr lang="pt-PT" dirty="0" smtClean="0"/>
-              <a:t> </a:t>
-            </a:r>
-            <a:r>
-              <a:rPr lang="pt-PT" dirty="0" err="1" smtClean="0"/>
-              <a:t>is</a:t>
-            </a:r>
-            <a:r>
-              <a:rPr lang="pt-PT" dirty="0" smtClean="0"/>
-              <a:t> </a:t>
-            </a:r>
-            <a:r>
-              <a:rPr lang="pt-PT" dirty="0" err="1" smtClean="0"/>
-              <a:t>MapReduce</a:t>
-            </a:r>
-            <a:r>
-              <a:rPr lang="pt-PT" dirty="0" smtClean="0"/>
-              <a:t>?</a:t>
-            </a:r>
-            <a:endParaRPr lang="pt-PT" dirty="0"/>
-          </a:p>
-        </p:txBody>
-      </p:sp>
-      <p:sp>
-        <p:nvSpPr>
-          <p:cNvPr id="3" name="Marcador de Posição de Conteúdo 2"/>
-          <p:cNvSpPr>
-            <a:spLocks noGrp="1"/>
-          </p:cNvSpPr>
-          <p:nvPr>
-            <p:ph idx="1"/>
-          </p:nvPr>
-        </p:nvSpPr>
-        <p:spPr/>
-        <p:txBody>
-          <a:bodyPr>
-            <a:normAutofit fontScale="92500" lnSpcReduction="20000"/>
-          </a:bodyPr>
-          <a:lstStyle/>
-          <a:p>
-            <a:r>
-              <a:rPr lang="en-US" dirty="0" err="1"/>
-              <a:t>MapReduce</a:t>
-            </a:r>
-            <a:r>
-              <a:rPr lang="en-US" dirty="0"/>
-              <a:t> is a programming </a:t>
-            </a:r>
-            <a:r>
-              <a:rPr lang="en-US" dirty="0" smtClean="0"/>
-              <a:t>model</a:t>
-            </a:r>
-            <a:r>
-              <a:rPr lang="en-US" dirty="0"/>
-              <a:t>, inspired by the map and reduce </a:t>
-            </a:r>
-            <a:r>
-              <a:rPr lang="en-US" dirty="0" smtClean="0"/>
-              <a:t>functions, </a:t>
-            </a:r>
-            <a:r>
-              <a:rPr lang="en-US" dirty="0"/>
-              <a:t>and an associated implementation for processing and generating large data sets with a parallel, distributed algorithm on a cluster</a:t>
-            </a:r>
-            <a:r>
-              <a:rPr lang="en-US" dirty="0" smtClean="0"/>
-              <a:t>. Between the two main steps there is an extra </a:t>
-            </a:r>
-            <a:r>
-              <a:rPr lang="en-US" dirty="0" smtClean="0"/>
-              <a:t>one </a:t>
-            </a:r>
-            <a:r>
-              <a:rPr lang="en-US" dirty="0" smtClean="0"/>
-              <a:t>called shuffle.</a:t>
-            </a:r>
-          </a:p>
-          <a:p>
-            <a:endParaRPr lang="en-US" dirty="0" smtClean="0"/>
-          </a:p>
-          <a:p>
-            <a:r>
-              <a:rPr lang="pt-PT" dirty="0" err="1" smtClean="0"/>
-              <a:t>The</a:t>
-            </a:r>
-            <a:r>
-              <a:rPr lang="pt-PT" dirty="0" smtClean="0"/>
-              <a:t> </a:t>
-            </a:r>
-            <a:r>
-              <a:rPr lang="en-US" dirty="0" smtClean="0"/>
-              <a:t>Map</a:t>
-            </a:r>
-            <a:r>
-              <a:rPr lang="pt-PT" dirty="0" smtClean="0"/>
-              <a:t> </a:t>
-            </a:r>
-            <a:r>
-              <a:rPr lang="pt-PT" dirty="0" err="1" smtClean="0"/>
-              <a:t>function</a:t>
-            </a:r>
-            <a:r>
-              <a:rPr lang="pt-PT" dirty="0" smtClean="0"/>
-              <a:t> </a:t>
-            </a:r>
-            <a:r>
-              <a:rPr lang="pt-PT" dirty="0" err="1"/>
-              <a:t>performs</a:t>
-            </a:r>
-            <a:r>
-              <a:rPr lang="pt-PT" dirty="0"/>
-              <a:t> </a:t>
-            </a:r>
-            <a:r>
-              <a:rPr lang="pt-PT" dirty="0" err="1"/>
-              <a:t>filtering</a:t>
-            </a:r>
-            <a:r>
-              <a:rPr lang="pt-PT" dirty="0"/>
-              <a:t> </a:t>
-            </a:r>
-            <a:r>
-              <a:rPr lang="pt-PT" dirty="0" err="1"/>
-              <a:t>and</a:t>
-            </a:r>
-            <a:r>
-              <a:rPr lang="pt-PT" dirty="0"/>
-              <a:t> </a:t>
-            </a:r>
-            <a:r>
-              <a:rPr lang="pt-PT" dirty="0" err="1" smtClean="0"/>
-              <a:t>sorting</a:t>
-            </a:r>
-            <a:r>
-              <a:rPr lang="pt-PT" dirty="0" smtClean="0"/>
-              <a:t> </a:t>
-            </a:r>
-            <a:r>
-              <a:rPr lang="pt-PT" dirty="0" err="1" smtClean="0"/>
-              <a:t>by</a:t>
-            </a:r>
-            <a:r>
-              <a:rPr lang="pt-PT" dirty="0" smtClean="0"/>
-              <a:t> </a:t>
-            </a:r>
-            <a:r>
-              <a:rPr lang="en-US" dirty="0" smtClean="0"/>
-              <a:t>processing a key/value </a:t>
-            </a:r>
-            <a:r>
-              <a:rPr lang="en-US" dirty="0"/>
-              <a:t>pair to generate a set of intermediate </a:t>
-            </a:r>
-            <a:r>
-              <a:rPr lang="en-US" dirty="0" smtClean="0"/>
-              <a:t>key/value pairs.</a:t>
-            </a:r>
-          </a:p>
-          <a:p>
-            <a:endParaRPr lang="en-US" dirty="0" smtClean="0"/>
-          </a:p>
-          <a:p>
-            <a:r>
-              <a:rPr lang="en-US" dirty="0" smtClean="0"/>
-              <a:t>The Reduce function </a:t>
-            </a:r>
-            <a:r>
-              <a:rPr lang="pt-PT" dirty="0" err="1"/>
-              <a:t>that</a:t>
-            </a:r>
-            <a:r>
-              <a:rPr lang="pt-PT" dirty="0"/>
-              <a:t> </a:t>
-            </a:r>
-            <a:r>
-              <a:rPr lang="pt-PT" dirty="0" err="1"/>
-              <a:t>performs</a:t>
-            </a:r>
-            <a:r>
-              <a:rPr lang="pt-PT" dirty="0"/>
-              <a:t> a </a:t>
-            </a:r>
-            <a:r>
-              <a:rPr lang="pt-PT" dirty="0" err="1"/>
-              <a:t>summary</a:t>
-            </a:r>
-            <a:r>
-              <a:rPr lang="pt-PT" dirty="0"/>
-              <a:t> </a:t>
-            </a:r>
-            <a:r>
-              <a:rPr lang="pt-PT" dirty="0" err="1" smtClean="0"/>
-              <a:t>operation</a:t>
-            </a:r>
-            <a:r>
-              <a:rPr lang="pt-PT" dirty="0" smtClean="0"/>
-              <a:t> </a:t>
-            </a:r>
-            <a:r>
-              <a:rPr lang="pt-PT" dirty="0" err="1" smtClean="0"/>
-              <a:t>and</a:t>
-            </a:r>
-            <a:r>
-              <a:rPr lang="pt-PT" dirty="0" smtClean="0"/>
-              <a:t> </a:t>
-            </a:r>
-            <a:r>
-              <a:rPr lang="en-US" dirty="0"/>
-              <a:t>merges all </a:t>
-            </a:r>
-            <a:r>
-              <a:rPr lang="en-US" dirty="0" smtClean="0"/>
-              <a:t>intermediate values </a:t>
-            </a:r>
-            <a:r>
-              <a:rPr lang="en-US" dirty="0"/>
-              <a:t>associated with the same intermediate </a:t>
-            </a:r>
-            <a:r>
-              <a:rPr lang="en-US" dirty="0" smtClean="0"/>
-              <a:t>key</a:t>
-            </a:r>
-            <a:r>
-              <a:rPr lang="en-US" dirty="0" smtClean="0"/>
-              <a:t>.</a:t>
-            </a:r>
-          </a:p>
-          <a:p>
-            <a:endParaRPr lang="en-US" dirty="0"/>
-          </a:p>
-          <a:p>
-            <a:r>
-              <a:rPr lang="en-US" dirty="0" smtClean="0"/>
-              <a:t>The shuffle function </a:t>
-            </a:r>
-            <a:r>
-              <a:rPr lang="en-GB" dirty="0"/>
-              <a:t> </a:t>
-            </a:r>
-            <a:r>
-              <a:rPr lang="en-GB" dirty="0" smtClean="0"/>
-              <a:t>redistributes </a:t>
-            </a:r>
-            <a:r>
-              <a:rPr lang="en-GB" dirty="0"/>
-              <a:t>data based on the output keys (produced by the </a:t>
-            </a:r>
-            <a:r>
-              <a:rPr lang="en-GB" dirty="0" smtClean="0"/>
-              <a:t>Map function</a:t>
-            </a:r>
-            <a:r>
-              <a:rPr lang="en-GB" dirty="0"/>
-              <a:t>), such that all data belonging to one key is located on the same worker </a:t>
-            </a:r>
-            <a:r>
-              <a:rPr lang="en-GB" dirty="0" smtClean="0"/>
-              <a:t>node.</a:t>
-            </a:r>
-            <a:endParaRPr lang="en-US" dirty="0" smtClean="0"/>
-          </a:p>
-          <a:p>
-            <a:endParaRPr lang="pt-PT" dirty="0"/>
-          </a:p>
-        </p:txBody>
-      </p:sp>
-    </p:spTree>
-    <p:extLst>
-      <p:ext uri="{BB962C8B-B14F-4D97-AF65-F5344CB8AC3E}">
-        <p14:creationId xmlns:p14="http://schemas.microsoft.com/office/powerpoint/2010/main" val="104844528"/>
-      </p:ext>
-    </p:extLst>
-  </p:cSld>
-  <p:clrMapOvr>
-    <a:masterClrMapping/>
-  </p:clrMapOvr>
-  <p:timing>
-    <p:tnLst>
-      <p:par>
-        <p:cTn id="1" dur="indefinite" restart="never" nodeType="tmRoot"/>
-      </p:par>
-    </p:tnLst>
-  </p:timing>
-</p:sld>
-</file>
-
-<file path=ppt/slides/slide4.xml><?xml version="1.0" encoding="utf-8"?>
-<p:sld xmlns:a="http://schemas.openxmlformats.org/drawingml/2006/main" xmlns:r="http://schemas.openxmlformats.org/officeDocument/2006/relationships" xmlns:p="http://schemas.openxmlformats.org/presentationml/2006/main">
-  <p:cSld>
-    <p:spTree>
-      <p:nvGrpSpPr>
-        <p:cNvPr id="1" name=""/>
-        <p:cNvGrpSpPr/>
-        <p:nvPr/>
-      </p:nvGrpSpPr>
-      <p:grpSpPr>
-        <a:xfrm>
-          <a:off x="0" y="0"/>
-          <a:ext cx="0" cy="0"/>
-          <a:chOff x="0" y="0"/>
-          <a:chExt cx="0" cy="0"/>
-        </a:xfrm>
-      </p:grpSpPr>
-      <p:sp>
-        <p:nvSpPr>
-          <p:cNvPr id="7" name="Marcador de Posição do Texto 6"/>
-          <p:cNvSpPr>
-            <a:spLocks noGrp="1"/>
-          </p:cNvSpPr>
-          <p:nvPr>
-            <p:ph type="body" sz="quarter" idx="3"/>
-          </p:nvPr>
-        </p:nvSpPr>
-        <p:spPr>
-          <a:xfrm>
-            <a:off x="3508195" y="228600"/>
-            <a:ext cx="4396339" cy="576262"/>
-          </a:xfrm>
-        </p:spPr>
-        <p:txBody>
-          <a:bodyPr/>
-          <a:lstStyle/>
-          <a:p>
-            <a:pPr algn="ctr"/>
-            <a:r>
-              <a:rPr lang="pt-PT" sz="4200" dirty="0" err="1" smtClean="0">
-                <a:solidFill>
-                  <a:schemeClr val="tx1"/>
-                </a:solidFill>
-              </a:rPr>
-              <a:t>MapReduce</a:t>
-            </a:r>
-            <a:endParaRPr lang="en-GB" sz="4200" dirty="0">
-              <a:solidFill>
-                <a:schemeClr val="tx1"/>
-              </a:solidFill>
-            </a:endParaRPr>
-          </a:p>
-        </p:txBody>
-      </p:sp>
-      <p:sp>
-        <p:nvSpPr>
-          <p:cNvPr id="11" name="CaixaDeTexto 10"/>
-          <p:cNvSpPr txBox="1"/>
-          <p:nvPr/>
-        </p:nvSpPr>
-        <p:spPr>
-          <a:xfrm>
-            <a:off x="981964" y="5473700"/>
-            <a:ext cx="4724400" cy="369332"/>
-          </a:xfrm>
-          <a:prstGeom prst="rect">
-            <a:avLst/>
-          </a:prstGeom>
-          <a:noFill/>
-        </p:spPr>
-        <p:txBody>
-          <a:bodyPr wrap="square" rtlCol="0">
-            <a:spAutoFit/>
-          </a:bodyPr>
-          <a:lstStyle/>
-          <a:p>
-            <a:pPr algn="ctr"/>
-            <a:r>
-              <a:rPr lang="pt-PT" dirty="0" err="1" smtClean="0"/>
-              <a:t>Simple</a:t>
-            </a:r>
-            <a:r>
-              <a:rPr lang="pt-PT" dirty="0" smtClean="0"/>
-              <a:t> </a:t>
-            </a:r>
-            <a:r>
-              <a:rPr lang="pt-PT" dirty="0" err="1" smtClean="0"/>
-              <a:t>MapReduce</a:t>
-            </a:r>
-            <a:endParaRPr lang="en-GB" dirty="0"/>
-          </a:p>
-        </p:txBody>
-      </p:sp>
-      <p:sp>
-        <p:nvSpPr>
-          <p:cNvPr id="12" name="CaixaDeTexto 11"/>
-          <p:cNvSpPr txBox="1"/>
-          <p:nvPr/>
-        </p:nvSpPr>
-        <p:spPr>
-          <a:xfrm>
-            <a:off x="6732586" y="5843032"/>
-            <a:ext cx="4724400" cy="369332"/>
-          </a:xfrm>
-          <a:prstGeom prst="rect">
-            <a:avLst/>
-          </a:prstGeom>
-          <a:noFill/>
-        </p:spPr>
-        <p:txBody>
-          <a:bodyPr wrap="square" rtlCol="0">
-            <a:spAutoFit/>
-          </a:bodyPr>
-          <a:lstStyle/>
-          <a:p>
-            <a:pPr algn="ctr"/>
-            <a:r>
-              <a:rPr lang="pt-PT" dirty="0" err="1" smtClean="0"/>
-              <a:t>MapReduce</a:t>
-            </a:r>
-            <a:r>
-              <a:rPr lang="pt-PT" dirty="0"/>
-              <a:t> </a:t>
-            </a:r>
-            <a:r>
-              <a:rPr lang="pt-PT" dirty="0" err="1" smtClean="0"/>
-              <a:t>using</a:t>
-            </a:r>
-            <a:r>
-              <a:rPr lang="pt-PT" dirty="0" smtClean="0"/>
-              <a:t> combine</a:t>
-            </a:r>
-            <a:endParaRPr lang="en-GB" dirty="0"/>
-          </a:p>
-        </p:txBody>
-      </p:sp>
-      <p:pic>
-        <p:nvPicPr>
-          <p:cNvPr id="14" name="Marcador de Posição de Conteúdo 13"/>
-          <p:cNvPicPr>
-            <a:picLocks noGrp="1" noChangeAspect="1"/>
-          </p:cNvPicPr>
-          <p:nvPr>
-            <p:ph sz="half" idx="2"/>
-          </p:nvPr>
-        </p:nvPicPr>
-        <p:blipFill>
-          <a:blip r:embed="rId2">
-            <a:extLst>
-              <a:ext uri="{28A0092B-C50C-407E-A947-70E740481C1C}">
-                <a14:useLocalDpi xmlns:a14="http://schemas.microsoft.com/office/drawing/2010/main" val="0"/>
-              </a:ext>
-            </a:extLst>
-          </a:blip>
-          <a:stretch>
-            <a:fillRect/>
-          </a:stretch>
-        </p:blipFill>
-        <p:spPr>
-          <a:xfrm>
-            <a:off x="555330" y="1665298"/>
-            <a:ext cx="5578770" cy="3569395"/>
-          </a:xfrm>
-        </p:spPr>
-      </p:pic>
-      <p:pic>
-        <p:nvPicPr>
-          <p:cNvPr id="16" name="Marcador de Posição de Conteúdo 15"/>
-          <p:cNvPicPr>
-            <a:picLocks noGrp="1" noChangeAspect="1"/>
-          </p:cNvPicPr>
-          <p:nvPr>
-            <p:ph sz="quarter" idx="4"/>
-          </p:nvPr>
-        </p:nvPicPr>
-        <p:blipFill>
-          <a:blip r:embed="rId3">
-            <a:extLst>
-              <a:ext uri="{28A0092B-C50C-407E-A947-70E740481C1C}">
-                <a14:useLocalDpi xmlns:a14="http://schemas.microsoft.com/office/drawing/2010/main" val="0"/>
-              </a:ext>
-            </a:extLst>
-          </a:blip>
-          <a:stretch>
-            <a:fillRect/>
-          </a:stretch>
-        </p:blipFill>
-        <p:spPr>
-          <a:xfrm>
-            <a:off x="6454774" y="1665298"/>
-            <a:ext cx="5280025" cy="3906831"/>
-          </a:xfrm>
-        </p:spPr>
-      </p:pic>
-    </p:spTree>
-    <p:extLst>
-      <p:ext uri="{BB962C8B-B14F-4D97-AF65-F5344CB8AC3E}">
-        <p14:creationId xmlns:p14="http://schemas.microsoft.com/office/powerpoint/2010/main" val="370236117"/>
-      </p:ext>
-    </p:extLst>
-  </p:cSld>
-  <p:clrMapOvr>
-    <a:masterClrMapping/>
-  </p:clrMapOvr>
-  <p:timing>
-    <p:tnLst>
-      <p:par>
-        <p:cTn id="1" dur="indefinite" restart="never" nodeType="tmRoot"/>
-      </p:par>
-    </p:tnLst>
-  </p:timing>
-</p:sld>
-</file>
-
-<file path=ppt/slides/slide5.xml><?xml version="1.0" encoding="utf-8"?>
-<p:sld xmlns:a="http://schemas.openxmlformats.org/drawingml/2006/main" xmlns:r="http://schemas.openxmlformats.org/officeDocument/2006/relationships" xmlns:p="http://schemas.openxmlformats.org/presentationml/2006/main">
-  <p:cSld>
-    <p:spTree>
-      <p:nvGrpSpPr>
-        <p:cNvPr id="1" name=""/>
-        <p:cNvGrpSpPr/>
-        <p:nvPr/>
-      </p:nvGrpSpPr>
-      <p:grpSpPr>
-        <a:xfrm>
-          <a:off x="0" y="0"/>
-          <a:ext cx="0" cy="0"/>
-          <a:chOff x="0" y="0"/>
-          <a:chExt cx="0" cy="0"/>
-        </a:xfrm>
-      </p:grpSpPr>
-      <p:sp>
-        <p:nvSpPr>
-          <p:cNvPr id="2" name="Título 1"/>
-          <p:cNvSpPr>
-            <a:spLocks noGrp="1"/>
-          </p:cNvSpPr>
-          <p:nvPr>
-            <p:ph type="title"/>
-          </p:nvPr>
-        </p:nvSpPr>
-        <p:spPr/>
-        <p:txBody>
-          <a:bodyPr/>
-          <a:lstStyle/>
-          <a:p>
-            <a:pPr algn="ctr"/>
-            <a:r>
-              <a:rPr lang="pt-PT" dirty="0" err="1" smtClean="0"/>
-              <a:t>MapReduce</a:t>
-            </a:r>
-            <a:r>
-              <a:rPr lang="pt-PT" dirty="0" smtClean="0"/>
-              <a:t> </a:t>
-            </a:r>
-            <a:r>
-              <a:rPr lang="pt-PT" dirty="0" err="1" smtClean="0"/>
-              <a:t>features</a:t>
-            </a:r>
-            <a:r>
-              <a:rPr lang="pt-PT" dirty="0" smtClean="0"/>
-              <a:t>/</a:t>
-            </a:r>
-            <a:r>
-              <a:rPr lang="pt-PT" dirty="0" err="1" smtClean="0"/>
-              <a:t>benefits</a:t>
-            </a:r>
-            <a:endParaRPr lang="pt-PT" dirty="0"/>
-          </a:p>
-        </p:txBody>
-      </p:sp>
-      <p:sp>
-        <p:nvSpPr>
-          <p:cNvPr id="3" name="Marcador de Posição de Conteúdo 2"/>
-          <p:cNvSpPr>
-            <a:spLocks noGrp="1"/>
-          </p:cNvSpPr>
-          <p:nvPr>
-            <p:ph idx="1"/>
-          </p:nvPr>
-        </p:nvSpPr>
-        <p:spPr/>
-        <p:txBody>
-          <a:bodyPr>
-            <a:normAutofit/>
-          </a:bodyPr>
-          <a:lstStyle/>
-          <a:p>
-            <a:r>
-              <a:rPr lang="en-US" dirty="0" smtClean="0"/>
-              <a:t>In multi-threaded implementations of </a:t>
-            </a:r>
-            <a:r>
-              <a:rPr lang="en-US" dirty="0" err="1" smtClean="0"/>
-              <a:t>MapReduce</a:t>
-            </a:r>
-            <a:r>
-              <a:rPr lang="en-US" dirty="0" smtClean="0"/>
-              <a:t> the </a:t>
-            </a:r>
-            <a:r>
-              <a:rPr lang="pt-PT" dirty="0" err="1" smtClean="0"/>
-              <a:t>scalability</a:t>
-            </a:r>
-            <a:r>
-              <a:rPr lang="pt-PT" dirty="0" smtClean="0"/>
-              <a:t>, </a:t>
-            </a:r>
-            <a:r>
-              <a:rPr lang="pt-PT" dirty="0" err="1" smtClean="0"/>
-              <a:t>fault-tolerance</a:t>
-            </a:r>
-            <a:r>
-              <a:rPr lang="pt-PT" dirty="0" smtClean="0"/>
-              <a:t> </a:t>
-            </a:r>
-            <a:r>
-              <a:rPr lang="pt-PT" dirty="0" err="1" smtClean="0"/>
-              <a:t>and</a:t>
-            </a:r>
-            <a:r>
-              <a:rPr lang="pt-PT" dirty="0" smtClean="0"/>
-              <a:t> performance </a:t>
-            </a:r>
-            <a:r>
-              <a:rPr lang="pt-PT" dirty="0" err="1" smtClean="0"/>
-              <a:t>of</a:t>
-            </a:r>
-            <a:r>
-              <a:rPr lang="pt-PT" dirty="0" smtClean="0"/>
-              <a:t> </a:t>
-            </a:r>
-            <a:r>
-              <a:rPr lang="pt-PT" dirty="0" err="1" smtClean="0"/>
-              <a:t>the</a:t>
-            </a:r>
-            <a:r>
-              <a:rPr lang="pt-PT" dirty="0" smtClean="0"/>
-              <a:t> </a:t>
-            </a:r>
-            <a:r>
-              <a:rPr lang="pt-PT" dirty="0" err="1" smtClean="0"/>
-              <a:t>program</a:t>
-            </a:r>
-            <a:r>
-              <a:rPr lang="pt-PT" dirty="0" smtClean="0"/>
-              <a:t> are </a:t>
-            </a:r>
-            <a:r>
-              <a:rPr lang="pt-PT" dirty="0" err="1" smtClean="0"/>
-              <a:t>largely</a:t>
-            </a:r>
-            <a:r>
-              <a:rPr lang="pt-PT" dirty="0" smtClean="0"/>
-              <a:t> </a:t>
-            </a:r>
-            <a:r>
-              <a:rPr lang="pt-PT" dirty="0" err="1" smtClean="0"/>
-              <a:t>increased</a:t>
-            </a:r>
-            <a:r>
-              <a:rPr lang="pt-PT" dirty="0" smtClean="0"/>
-              <a:t> </a:t>
-            </a:r>
-            <a:r>
-              <a:rPr lang="pt-PT" dirty="0" err="1" smtClean="0"/>
-              <a:t>when</a:t>
-            </a:r>
-            <a:r>
-              <a:rPr lang="pt-PT" dirty="0" smtClean="0"/>
-              <a:t> </a:t>
-            </a:r>
-            <a:r>
-              <a:rPr lang="pt-PT" dirty="0" err="1" smtClean="0"/>
-              <a:t>compared</a:t>
-            </a:r>
-            <a:r>
-              <a:rPr lang="pt-PT" dirty="0" smtClean="0"/>
-              <a:t> </a:t>
-            </a:r>
-            <a:r>
-              <a:rPr lang="pt-PT" dirty="0" err="1" smtClean="0"/>
-              <a:t>with</a:t>
-            </a:r>
-            <a:r>
-              <a:rPr lang="pt-PT" dirty="0" smtClean="0"/>
-              <a:t> single-</a:t>
-            </a:r>
-            <a:r>
-              <a:rPr lang="pt-PT" dirty="0" err="1" smtClean="0"/>
-              <a:t>threaded</a:t>
-            </a:r>
-            <a:r>
-              <a:rPr lang="pt-PT" dirty="0" smtClean="0"/>
-              <a:t> </a:t>
-            </a:r>
-            <a:r>
-              <a:rPr lang="pt-PT" dirty="0" err="1" smtClean="0"/>
-              <a:t>implementations</a:t>
-            </a:r>
-            <a:r>
-              <a:rPr lang="pt-PT" dirty="0" smtClean="0"/>
-              <a:t> </a:t>
-            </a:r>
-            <a:r>
-              <a:rPr lang="pt-PT" dirty="0" err="1" smtClean="0"/>
-              <a:t>of</a:t>
-            </a:r>
-            <a:r>
-              <a:rPr lang="pt-PT" dirty="0" smtClean="0"/>
-              <a:t> </a:t>
-            </a:r>
-            <a:r>
-              <a:rPr lang="pt-PT" dirty="0" err="1" smtClean="0"/>
-              <a:t>MapReduce</a:t>
-            </a:r>
-            <a:r>
-              <a:rPr lang="pt-PT" dirty="0" smtClean="0"/>
-              <a:t> </a:t>
-            </a:r>
-            <a:r>
-              <a:rPr lang="pt-PT" dirty="0" err="1" smtClean="0"/>
-              <a:t>or</a:t>
-            </a:r>
-            <a:r>
-              <a:rPr lang="pt-PT" dirty="0" smtClean="0"/>
-              <a:t> non-</a:t>
-            </a:r>
-            <a:r>
-              <a:rPr lang="pt-PT" dirty="0" err="1"/>
-              <a:t>M</a:t>
-            </a:r>
-            <a:r>
-              <a:rPr lang="pt-PT" dirty="0" err="1" smtClean="0"/>
-              <a:t>apReduce</a:t>
-            </a:r>
-            <a:r>
-              <a:rPr lang="pt-PT" dirty="0" smtClean="0"/>
-              <a:t>.</a:t>
-            </a:r>
-            <a:endParaRPr lang="en-US" dirty="0" smtClean="0"/>
-          </a:p>
-          <a:p>
-            <a:r>
-              <a:rPr lang="en-US" dirty="0" err="1" smtClean="0"/>
-              <a:t>MapReduce</a:t>
-            </a:r>
-            <a:r>
-              <a:rPr lang="en-US" dirty="0" smtClean="0"/>
-              <a:t> programs are </a:t>
-            </a:r>
-            <a:r>
-              <a:rPr lang="en-US" dirty="0"/>
-              <a:t>automatically parallelized and executed on a large </a:t>
-            </a:r>
-            <a:r>
-              <a:rPr lang="en-US" dirty="0" smtClean="0"/>
-              <a:t>cluster. </a:t>
-            </a:r>
-            <a:r>
-              <a:rPr lang="en-US" dirty="0"/>
-              <a:t>The run-time system takes care of </a:t>
-            </a:r>
-            <a:r>
-              <a:rPr lang="en-US" dirty="0" smtClean="0"/>
-              <a:t>the details </a:t>
-            </a:r>
-            <a:r>
-              <a:rPr lang="en-US" dirty="0"/>
-              <a:t>of partitioning the input data, scheduling the program' s execution across a set of machines, handling machine failures, and managing the required </a:t>
-            </a:r>
-            <a:r>
-              <a:rPr lang="en-US" dirty="0" smtClean="0"/>
-              <a:t>inter-machine communication</a:t>
-            </a:r>
-            <a:r>
-              <a:rPr lang="en-US" dirty="0"/>
-              <a:t>. </a:t>
-            </a:r>
-            <a:endParaRPr lang="en-US" dirty="0" smtClean="0"/>
-          </a:p>
-          <a:p>
-            <a:r>
-              <a:rPr lang="en-US" dirty="0" smtClean="0"/>
-              <a:t>This </a:t>
-            </a:r>
-            <a:r>
-              <a:rPr lang="en-US" dirty="0"/>
-              <a:t>allows programmers without </a:t>
-            </a:r>
-            <a:r>
-              <a:rPr lang="en-US" dirty="0" smtClean="0"/>
-              <a:t>any experience </a:t>
-            </a:r>
-            <a:r>
-              <a:rPr lang="en-US" dirty="0"/>
-              <a:t>with parallel and distributed systems to easily utilize the resources of a large distributed system</a:t>
-            </a:r>
-            <a:endParaRPr lang="pt-PT" dirty="0"/>
-          </a:p>
-        </p:txBody>
-      </p:sp>
-    </p:spTree>
-    <p:extLst>
-      <p:ext uri="{BB962C8B-B14F-4D97-AF65-F5344CB8AC3E}">
-        <p14:creationId xmlns:p14="http://schemas.microsoft.com/office/powerpoint/2010/main" val="4057155545"/>
-      </p:ext>
-    </p:extLst>
-  </p:cSld>
-  <p:clrMapOvr>
-    <a:masterClrMapping/>
-  </p:clrMapOvr>
-  <p:timing>
-    <p:tnLst>
-      <p:par>
-        <p:cTn id="1" dur="indefinite" restart="never" nodeType="tmRoot"/>
-      </p:par>
-    </p:tnLst>
-  </p:timing>
-</p:sld>
-</file>
-
-<file path=ppt/slides/slide6.xml><?xml version="1.0" encoding="utf-8"?>
-<p:sld xmlns:a="http://schemas.openxmlformats.org/drawingml/2006/main" xmlns:r="http://schemas.openxmlformats.org/officeDocument/2006/relationships" xmlns:p="http://schemas.openxmlformats.org/presentationml/2006/main">
-  <p:cSld>
-    <p:spTree>
-      <p:nvGrpSpPr>
-        <p:cNvPr id="1" name=""/>
-        <p:cNvGrpSpPr/>
-        <p:nvPr/>
-      </p:nvGrpSpPr>
-      <p:grpSpPr>
-        <a:xfrm>
-          <a:off x="0" y="0"/>
-          <a:ext cx="0" cy="0"/>
-          <a:chOff x="0" y="0"/>
-          <a:chExt cx="0" cy="0"/>
-        </a:xfrm>
-      </p:grpSpPr>
-      <p:sp>
-        <p:nvSpPr>
-          <p:cNvPr id="2" name="Título 1"/>
-          <p:cNvSpPr>
-            <a:spLocks noGrp="1"/>
-          </p:cNvSpPr>
-          <p:nvPr>
-            <p:ph type="title"/>
-          </p:nvPr>
-        </p:nvSpPr>
-        <p:spPr/>
-        <p:txBody>
-          <a:bodyPr/>
-          <a:lstStyle/>
-          <a:p>
-            <a:pPr algn="ctr"/>
-            <a:r>
-              <a:rPr lang="pt-PT" dirty="0" err="1" smtClean="0"/>
-              <a:t>Programming</a:t>
-            </a:r>
-            <a:r>
-              <a:rPr lang="pt-PT" dirty="0" smtClean="0"/>
-              <a:t> </a:t>
-            </a:r>
-            <a:r>
-              <a:rPr lang="pt-PT" dirty="0" err="1" smtClean="0"/>
-              <a:t>model</a:t>
-            </a:r>
-            <a:endParaRPr lang="en-GB" dirty="0"/>
-          </a:p>
-        </p:txBody>
-      </p:sp>
-      <p:sp>
-        <p:nvSpPr>
-          <p:cNvPr id="3" name="Marcador de Posição de Conteúdo 2"/>
-          <p:cNvSpPr>
-            <a:spLocks noGrp="1"/>
-          </p:cNvSpPr>
-          <p:nvPr>
-            <p:ph idx="1"/>
-          </p:nvPr>
-        </p:nvSpPr>
-        <p:spPr/>
-        <p:txBody>
-          <a:bodyPr>
-            <a:normAutofit/>
-          </a:bodyPr>
-          <a:lstStyle/>
-          <a:p>
-            <a:r>
-              <a:rPr lang="pt-PT" dirty="0" smtClean="0"/>
-              <a:t>Input/</a:t>
-            </a:r>
-            <a:r>
-              <a:rPr lang="pt-PT" dirty="0"/>
-              <a:t> </a:t>
-            </a:r>
-            <a:r>
-              <a:rPr lang="pt-PT" dirty="0" smtClean="0"/>
-              <a:t>Output: </a:t>
-            </a:r>
-            <a:r>
-              <a:rPr lang="pt-PT" dirty="0" err="1"/>
-              <a:t>key</a:t>
-            </a:r>
-            <a:r>
-              <a:rPr lang="pt-PT" dirty="0"/>
-              <a:t>/</a:t>
-            </a:r>
-            <a:r>
-              <a:rPr lang="pt-PT" dirty="0" err="1"/>
-              <a:t>value</a:t>
-            </a:r>
-            <a:r>
-              <a:rPr lang="pt-PT" dirty="0"/>
-              <a:t> </a:t>
-            </a:r>
-            <a:r>
-              <a:rPr lang="pt-PT" dirty="0" err="1" smtClean="0"/>
-              <a:t>pairs</a:t>
-            </a:r>
-            <a:r>
-              <a:rPr lang="pt-PT" dirty="0" smtClean="0"/>
-              <a:t>.</a:t>
-            </a:r>
-          </a:p>
-          <a:p>
-            <a:r>
-              <a:rPr lang="en-GB" dirty="0"/>
-              <a:t>Map, </a:t>
-            </a:r>
-            <a:r>
-              <a:rPr lang="en-GB" dirty="0" smtClean="0"/>
-              <a:t>defined </a:t>
-            </a:r>
-            <a:r>
-              <a:rPr lang="en-GB" dirty="0"/>
-              <a:t>by the user, takes an input pair and produces a set of intermediate key/value pairs. The </a:t>
-            </a:r>
-            <a:r>
-              <a:rPr lang="en-GB" dirty="0" err="1"/>
-              <a:t>MapReduce</a:t>
-            </a:r>
-            <a:r>
-              <a:rPr lang="en-GB" dirty="0"/>
-              <a:t> library groups together all intermediate values associated with the same intermediate key </a:t>
-            </a:r>
-            <a:r>
-              <a:rPr lang="en-GB" dirty="0" smtClean="0"/>
-              <a:t>X </a:t>
-            </a:r>
-            <a:r>
-              <a:rPr lang="en-GB" dirty="0"/>
-              <a:t>and passes </a:t>
-            </a:r>
-            <a:r>
-              <a:rPr lang="en-GB" dirty="0" smtClean="0"/>
-              <a:t>them to </a:t>
-            </a:r>
-            <a:r>
-              <a:rPr lang="en-GB" dirty="0"/>
-              <a:t>the Reduce function</a:t>
-            </a:r>
-            <a:r>
-              <a:rPr lang="en-GB" dirty="0" smtClean="0"/>
-              <a:t>.</a:t>
-            </a:r>
-          </a:p>
-          <a:p>
-            <a:r>
-              <a:rPr lang="en-GB" dirty="0"/>
-              <a:t>The Reduce function, also </a:t>
-            </a:r>
-            <a:r>
-              <a:rPr lang="en-GB" dirty="0" smtClean="0"/>
-              <a:t>provided by </a:t>
-            </a:r>
-            <a:r>
-              <a:rPr lang="en-GB" dirty="0"/>
-              <a:t>the user, </a:t>
-            </a:r>
-            <a:r>
-              <a:rPr lang="en-GB" dirty="0" smtClean="0"/>
-              <a:t>accepts an </a:t>
-            </a:r>
-            <a:r>
-              <a:rPr lang="en-GB" dirty="0"/>
-              <a:t>intermediate key X</a:t>
-            </a:r>
-            <a:r>
-              <a:rPr lang="en-GB" dirty="0" smtClean="0"/>
-              <a:t> </a:t>
-            </a:r>
-            <a:r>
-              <a:rPr lang="en-GB" dirty="0"/>
-              <a:t>and a set of values for that key . </a:t>
-            </a:r>
-            <a:r>
-              <a:rPr lang="en-GB" dirty="0" smtClean="0"/>
-              <a:t>It merges </a:t>
-            </a:r>
-            <a:r>
-              <a:rPr lang="en-GB" dirty="0"/>
-              <a:t>together these values to form a possibly </a:t>
-            </a:r>
-            <a:r>
-              <a:rPr lang="en-GB" dirty="0" smtClean="0"/>
-              <a:t>smaller set </a:t>
-            </a:r>
-            <a:r>
-              <a:rPr lang="en-GB" dirty="0"/>
-              <a:t>of values. </a:t>
-            </a:r>
-            <a:r>
-              <a:rPr lang="en-GB" dirty="0" smtClean="0"/>
-              <a:t>Typically </a:t>
-            </a:r>
-            <a:r>
-              <a:rPr lang="en-GB" dirty="0"/>
-              <a:t>just zero or one output value </a:t>
-            </a:r>
-            <a:r>
-              <a:rPr lang="en-GB" dirty="0" smtClean="0"/>
-              <a:t>is produced </a:t>
-            </a:r>
-            <a:r>
-              <a:rPr lang="en-GB" dirty="0"/>
-              <a:t>per Reduce in vocation. The intermediate values are supplied to the user' s reduce function via an iterator . This </a:t>
-            </a:r>
-            <a:r>
-              <a:rPr lang="en-GB" dirty="0" smtClean="0"/>
-              <a:t>allows </a:t>
-            </a:r>
-            <a:r>
-              <a:rPr lang="en-GB" dirty="0"/>
-              <a:t>to handle lists of values that are </a:t>
-            </a:r>
-            <a:r>
-              <a:rPr lang="en-GB" dirty="0" smtClean="0"/>
-              <a:t>too large to fit </a:t>
-            </a:r>
-            <a:r>
-              <a:rPr lang="en-GB" dirty="0"/>
-              <a:t>in memory</a:t>
-            </a:r>
-          </a:p>
-        </p:txBody>
-      </p:sp>
-    </p:spTree>
-    <p:extLst>
-      <p:ext uri="{BB962C8B-B14F-4D97-AF65-F5344CB8AC3E}">
-        <p14:creationId xmlns:p14="http://schemas.microsoft.com/office/powerpoint/2010/main" val="3990928321"/>
-      </p:ext>
-    </p:extLst>
-  </p:cSld>
-  <p:clrMapOvr>
-    <a:masterClrMapping/>
-  </p:clrMapOvr>
-  <p:timing>
-    <p:tnLst>
-      <p:par>
-        <p:cTn id="1" dur="indefinite" restart="never" nodeType="tmRoot"/>
-      </p:par>
-    </p:tnLst>
-  </p:timing>
-</p:sld>
-</file>
-
-<file path=ppt/slides/slide7.xml><?xml version="1.0" encoding="utf-8"?>
-<p:sld xmlns:a="http://schemas.openxmlformats.org/drawingml/2006/main" xmlns:r="http://schemas.openxmlformats.org/officeDocument/2006/relationships" xmlns:p="http://schemas.openxmlformats.org/presentationml/2006/main">
-  <p:cSld>
-    <p:spTree>
-      <p:nvGrpSpPr>
-        <p:cNvPr id="1" name=""/>
-        <p:cNvGrpSpPr/>
-        <p:nvPr/>
-      </p:nvGrpSpPr>
-      <p:grpSpPr>
-        <a:xfrm>
-          <a:off x="0" y="0"/>
-          <a:ext cx="0" cy="0"/>
-          <a:chOff x="0" y="0"/>
-          <a:chExt cx="0" cy="0"/>
-        </a:xfrm>
-      </p:grpSpPr>
-      <p:sp>
-        <p:nvSpPr>
-          <p:cNvPr id="2" name="Título 1"/>
-          <p:cNvSpPr>
-            <a:spLocks noGrp="1"/>
-          </p:cNvSpPr>
-          <p:nvPr>
-            <p:ph type="title"/>
-          </p:nvPr>
-        </p:nvSpPr>
-        <p:spPr/>
-        <p:txBody>
-          <a:bodyPr/>
-          <a:lstStyle/>
-          <a:p>
-            <a:pPr algn="ctr"/>
-            <a:r>
-              <a:rPr lang="pt-PT" dirty="0" err="1" smtClean="0"/>
-              <a:t>Practical</a:t>
-            </a:r>
-            <a:r>
-              <a:rPr lang="pt-PT" dirty="0" smtClean="0"/>
-              <a:t> </a:t>
-            </a:r>
-            <a:r>
-              <a:rPr lang="pt-PT" dirty="0" err="1" smtClean="0"/>
-              <a:t>example</a:t>
-            </a:r>
-            <a:endParaRPr lang="en-GB" dirty="0"/>
-          </a:p>
-        </p:txBody>
-      </p:sp>
-      <p:sp>
-        <p:nvSpPr>
-          <p:cNvPr id="5" name="CaixaDeTexto 4"/>
-          <p:cNvSpPr txBox="1"/>
-          <p:nvPr/>
-        </p:nvSpPr>
-        <p:spPr>
-          <a:xfrm>
-            <a:off x="7537983" y="2122854"/>
-            <a:ext cx="3378200" cy="1200329"/>
-          </a:xfrm>
-          <a:prstGeom prst="rect">
-            <a:avLst/>
-          </a:prstGeom>
-          <a:noFill/>
-        </p:spPr>
-        <p:txBody>
-          <a:bodyPr wrap="square" rtlCol="0">
-            <a:spAutoFit/>
-          </a:bodyPr>
-          <a:lstStyle/>
-          <a:p>
-            <a:r>
-              <a:rPr lang="pt-PT" dirty="0" err="1"/>
-              <a:t>M</a:t>
-            </a:r>
-            <a:r>
-              <a:rPr lang="pt-PT" dirty="0" err="1" smtClean="0"/>
-              <a:t>apping</a:t>
-            </a:r>
-            <a:r>
-              <a:rPr lang="pt-PT" dirty="0" smtClean="0"/>
-              <a:t> </a:t>
-            </a:r>
-            <a:r>
-              <a:rPr lang="pt-PT" dirty="0" err="1" smtClean="0"/>
-              <a:t>the</a:t>
-            </a:r>
-            <a:r>
-              <a:rPr lang="pt-PT" dirty="0" smtClean="0"/>
-              <a:t> </a:t>
-            </a:r>
-            <a:r>
-              <a:rPr lang="pt-PT" dirty="0" err="1" smtClean="0"/>
-              <a:t>number</a:t>
-            </a:r>
-            <a:r>
-              <a:rPr lang="pt-PT" dirty="0" smtClean="0"/>
-              <a:t> </a:t>
-            </a:r>
-            <a:r>
-              <a:rPr lang="pt-PT" dirty="0" err="1" smtClean="0"/>
-              <a:t>of</a:t>
-            </a:r>
-            <a:r>
-              <a:rPr lang="pt-PT" dirty="0" smtClean="0"/>
-              <a:t> </a:t>
-            </a:r>
-            <a:r>
-              <a:rPr lang="pt-PT" dirty="0" err="1" smtClean="0"/>
-              <a:t>occurrences</a:t>
-            </a:r>
-            <a:r>
-              <a:rPr lang="pt-PT" dirty="0" smtClean="0"/>
-              <a:t> </a:t>
-            </a:r>
-            <a:r>
-              <a:rPr lang="pt-PT" dirty="0" err="1" smtClean="0"/>
-              <a:t>of</a:t>
-            </a:r>
-            <a:r>
-              <a:rPr lang="pt-PT" dirty="0" smtClean="0"/>
-              <a:t> a </a:t>
-            </a:r>
-            <a:r>
-              <a:rPr lang="pt-PT" dirty="0" err="1" smtClean="0"/>
-              <a:t>certain</a:t>
-            </a:r>
-            <a:r>
-              <a:rPr lang="pt-PT" dirty="0" smtClean="0"/>
-              <a:t> </a:t>
-            </a:r>
-            <a:r>
-              <a:rPr lang="pt-PT" dirty="0" err="1" smtClean="0"/>
-              <a:t>word</a:t>
-            </a:r>
-            <a:r>
-              <a:rPr lang="pt-PT" dirty="0" smtClean="0"/>
-              <a:t> in a </a:t>
-            </a:r>
-            <a:r>
-              <a:rPr lang="pt-PT" dirty="0" err="1" smtClean="0"/>
-              <a:t>collection</a:t>
-            </a:r>
-            <a:r>
-              <a:rPr lang="pt-PT" dirty="0" smtClean="0"/>
-              <a:t> </a:t>
-            </a:r>
-            <a:r>
-              <a:rPr lang="pt-PT" dirty="0" err="1" smtClean="0"/>
-              <a:t>of</a:t>
-            </a:r>
-            <a:r>
-              <a:rPr lang="pt-PT" dirty="0" smtClean="0"/>
-              <a:t> </a:t>
-            </a:r>
-            <a:r>
-              <a:rPr lang="pt-PT" dirty="0" err="1" smtClean="0"/>
-              <a:t>books</a:t>
-            </a:r>
-            <a:r>
-              <a:rPr lang="pt-PT" dirty="0" smtClean="0"/>
-              <a:t>.</a:t>
-            </a:r>
-            <a:endParaRPr lang="en-GB" dirty="0"/>
-          </a:p>
-        </p:txBody>
-      </p:sp>
-      <p:pic>
-        <p:nvPicPr>
-          <p:cNvPr id="8" name="Marcador de Posição de Conteúdo 7"/>
-          <p:cNvPicPr>
-            <a:picLocks noGrp="1" noChangeAspect="1"/>
-          </p:cNvPicPr>
-          <p:nvPr>
-            <p:ph idx="1"/>
-          </p:nvPr>
-        </p:nvPicPr>
-        <p:blipFill>
-          <a:blip r:embed="rId2">
-            <a:extLst>
-              <a:ext uri="{28A0092B-C50C-407E-A947-70E740481C1C}">
-                <a14:useLocalDpi xmlns:a14="http://schemas.microsoft.com/office/drawing/2010/main" val="0"/>
-              </a:ext>
-            </a:extLst>
-          </a:blip>
-          <a:stretch>
-            <a:fillRect/>
-          </a:stretch>
-        </p:blipFill>
-        <p:spPr>
-          <a:xfrm>
-            <a:off x="1282700" y="1768714"/>
-            <a:ext cx="5988583" cy="4491438"/>
-          </a:xfrm>
-        </p:spPr>
-      </p:pic>
-    </p:spTree>
-    <p:extLst>
-      <p:ext uri="{BB962C8B-B14F-4D97-AF65-F5344CB8AC3E}">
-        <p14:creationId xmlns:p14="http://schemas.microsoft.com/office/powerpoint/2010/main" val="2522475347"/>
-      </p:ext>
-    </p:extLst>
-  </p:cSld>
-  <p:clrMapOvr>
-    <a:masterClrMapping/>
-  </p:clrMapOvr>
-  <p:timing>
-    <p:tnLst>
-      <p:par>
-        <p:cTn id="1" dur="indefinite" restart="never" nodeType="tmRoot"/>
-      </p:par>
-    </p:tnLst>
-  </p:timing>
-</p:sld>
-</file>
-
-<file path=ppt/slides/slide8.xml><?xml version="1.0" encoding="utf-8"?>
+<file path=ppt/slides/slide10.xml><?xml version="1.0" encoding="utf-8"?>
 <p:sld xmlns:a="http://schemas.openxmlformats.org/drawingml/2006/main" xmlns:r="http://schemas.openxmlformats.org/officeDocument/2006/relationships" xmlns:p="http://schemas.openxmlformats.org/presentationml/2006/main">
   <p:cSld>
     <p:spTree>
@@ -7784,7 +6284,124 @@
 </p:sld>
 </file>
 
-<file path=ppt/slides/slide9.xml><?xml version="1.0" encoding="utf-8"?>
+<file path=ppt/slides/slide11.xml><?xml version="1.0" encoding="utf-8"?>
+<p:sld xmlns:a="http://schemas.openxmlformats.org/drawingml/2006/main" xmlns:r="http://schemas.openxmlformats.org/officeDocument/2006/relationships" xmlns:p="http://schemas.openxmlformats.org/presentationml/2006/main">
+  <p:cSld>
+    <p:spTree>
+      <p:nvGrpSpPr>
+        <p:cNvPr id="1" name=""/>
+        <p:cNvGrpSpPr/>
+        <p:nvPr/>
+      </p:nvGrpSpPr>
+      <p:grpSpPr>
+        <a:xfrm>
+          <a:off x="0" y="0"/>
+          <a:ext cx="0" cy="0"/>
+          <a:chOff x="0" y="0"/>
+          <a:chExt cx="0" cy="0"/>
+        </a:xfrm>
+      </p:grpSpPr>
+      <p:sp>
+        <p:nvSpPr>
+          <p:cNvPr id="2" name="Título 1"/>
+          <p:cNvSpPr>
+            <a:spLocks noGrp="1"/>
+          </p:cNvSpPr>
+          <p:nvPr>
+            <p:ph type="title"/>
+          </p:nvPr>
+        </p:nvSpPr>
+        <p:spPr/>
+        <p:txBody>
+          <a:bodyPr/>
+          <a:lstStyle/>
+          <a:p>
+            <a:pPr algn="ctr"/>
+            <a:r>
+              <a:rPr lang="en-GB" dirty="0"/>
+              <a:t>Large-Scale PDF Generation</a:t>
+            </a:r>
+          </a:p>
+        </p:txBody>
+      </p:sp>
+      <p:sp>
+        <p:nvSpPr>
+          <p:cNvPr id="3" name="Marcador de Posição de Conteúdo 2"/>
+          <p:cNvSpPr>
+            <a:spLocks noGrp="1"/>
+          </p:cNvSpPr>
+          <p:nvPr>
+            <p:ph idx="1"/>
+          </p:nvPr>
+        </p:nvSpPr>
+        <p:spPr/>
+        <p:txBody>
+          <a:bodyPr/>
+          <a:lstStyle/>
+          <a:p>
+            <a:r>
+              <a:rPr lang="en-GB" dirty="0"/>
+              <a:t>The New York Times needed to generate PDF files for 11,000,000 articles (every article from 1851-1980) in the form of images scanned from the original paper</a:t>
+            </a:r>
+          </a:p>
+          <a:p>
+            <a:r>
+              <a:rPr lang="en-GB" dirty="0"/>
+              <a:t>Each article is composed of numerous TIFF images which are scaled and glued together</a:t>
+            </a:r>
+          </a:p>
+          <a:p>
+            <a:endParaRPr lang="pt-PT" dirty="0" smtClean="0"/>
+          </a:p>
+          <a:p>
+            <a:r>
+              <a:rPr lang="en-US" altLang="en-US" dirty="0"/>
+              <a:t>4TB of scanned articles were sent to Amazon Simple Storage </a:t>
+            </a:r>
+            <a:r>
+              <a:rPr lang="en-US" altLang="en-US" dirty="0" smtClean="0"/>
+              <a:t>Service</a:t>
+            </a:r>
+          </a:p>
+          <a:p>
+            <a:r>
+              <a:rPr lang="en-GB" dirty="0"/>
+              <a:t>A cluster of Amazon Elastic Compute </a:t>
+            </a:r>
+            <a:r>
+              <a:rPr lang="en-GB" dirty="0" smtClean="0"/>
+              <a:t>Cloud(EC2) </a:t>
+            </a:r>
+            <a:r>
+              <a:rPr lang="en-GB" dirty="0"/>
+              <a:t>machines was configured to distribute the PDF generation via Hadoop</a:t>
+            </a:r>
+          </a:p>
+          <a:p>
+            <a:r>
+              <a:rPr lang="en-GB" dirty="0"/>
+              <a:t>Using 100 EC2 instances and 24 hours, the New York Times was able to convert 4TB of scanned articles to 1.5TB of PDF documents</a:t>
+            </a:r>
+          </a:p>
+          <a:p>
+            <a:endParaRPr lang="en-GB" dirty="0"/>
+          </a:p>
+        </p:txBody>
+      </p:sp>
+    </p:spTree>
+    <p:extLst>
+      <p:ext uri="{BB962C8B-B14F-4D97-AF65-F5344CB8AC3E}">
+        <p14:creationId xmlns:p14="http://schemas.microsoft.com/office/powerpoint/2010/main" val="1640963446"/>
+      </p:ext>
+    </p:extLst>
+  </p:cSld>
+  <p:clrMapOvr>
+    <a:masterClrMapping/>
+  </p:clrMapOvr>
+</p:sld>
+</file>
+
+<file path=ppt/slides/slide12.xml><?xml version="1.0" encoding="utf-8"?>
 <p:sld xmlns:a="http://schemas.openxmlformats.org/drawingml/2006/main" xmlns:r="http://schemas.openxmlformats.org/officeDocument/2006/relationships" xmlns:p="http://schemas.openxmlformats.org/presentationml/2006/main">
   <p:cSld>
     <p:spTree>
@@ -7834,6 +6451,1919 @@
     <p:extLst>
       <p:ext uri="{BB962C8B-B14F-4D97-AF65-F5344CB8AC3E}">
         <p14:creationId xmlns:p14="http://schemas.microsoft.com/office/powerpoint/2010/main" val="542759797"/>
+      </p:ext>
+    </p:extLst>
+  </p:cSld>
+  <p:clrMapOvr>
+    <a:masterClrMapping/>
+  </p:clrMapOvr>
+  <p:timing>
+    <p:tnLst>
+      <p:par>
+        <p:cTn id="1" dur="indefinite" restart="never" nodeType="tmRoot"/>
+      </p:par>
+    </p:tnLst>
+  </p:timing>
+</p:sld>
+</file>
+
+<file path=ppt/slides/slide2.xml><?xml version="1.0" encoding="utf-8"?>
+<p:sld xmlns:a="http://schemas.openxmlformats.org/drawingml/2006/main" xmlns:r="http://schemas.openxmlformats.org/officeDocument/2006/relationships" xmlns:p="http://schemas.openxmlformats.org/presentationml/2006/main">
+  <p:cSld>
+    <p:spTree>
+      <p:nvGrpSpPr>
+        <p:cNvPr id="1" name=""/>
+        <p:cNvGrpSpPr/>
+        <p:nvPr/>
+      </p:nvGrpSpPr>
+      <p:grpSpPr>
+        <a:xfrm>
+          <a:off x="0" y="0"/>
+          <a:ext cx="0" cy="0"/>
+          <a:chOff x="0" y="0"/>
+          <a:chExt cx="0" cy="0"/>
+        </a:xfrm>
+      </p:grpSpPr>
+      <p:sp>
+        <p:nvSpPr>
+          <p:cNvPr id="2" name="Título 1"/>
+          <p:cNvSpPr>
+            <a:spLocks noGrp="1"/>
+          </p:cNvSpPr>
+          <p:nvPr>
+            <p:ph type="title"/>
+          </p:nvPr>
+        </p:nvSpPr>
+        <p:spPr/>
+        <p:txBody>
+          <a:bodyPr/>
+          <a:lstStyle/>
+          <a:p>
+            <a:pPr algn="ctr"/>
+            <a:r>
+              <a:rPr lang="pt-PT" dirty="0" err="1" smtClean="0"/>
+              <a:t>Why</a:t>
+            </a:r>
+            <a:r>
+              <a:rPr lang="pt-PT" dirty="0" smtClean="0"/>
+              <a:t> </a:t>
+            </a:r>
+            <a:r>
+              <a:rPr lang="pt-PT" dirty="0" err="1" smtClean="0"/>
+              <a:t>was</a:t>
+            </a:r>
+            <a:r>
+              <a:rPr lang="pt-PT" dirty="0" smtClean="0"/>
+              <a:t> </a:t>
+            </a:r>
+            <a:r>
+              <a:rPr lang="pt-PT" dirty="0" err="1" smtClean="0"/>
+              <a:t>MapReduce</a:t>
+            </a:r>
+            <a:r>
+              <a:rPr lang="pt-PT" dirty="0" smtClean="0"/>
+              <a:t> </a:t>
+            </a:r>
+            <a:r>
+              <a:rPr lang="pt-PT" dirty="0" err="1" smtClean="0"/>
+              <a:t>created</a:t>
+            </a:r>
+            <a:r>
+              <a:rPr lang="pt-PT" dirty="0" smtClean="0"/>
+              <a:t>?</a:t>
+            </a:r>
+            <a:endParaRPr lang="en-GB" dirty="0"/>
+          </a:p>
+        </p:txBody>
+      </p:sp>
+      <p:sp>
+        <p:nvSpPr>
+          <p:cNvPr id="7" name="Marcador de Posição de Conteúdo 6"/>
+          <p:cNvSpPr>
+            <a:spLocks noGrp="1"/>
+          </p:cNvSpPr>
+          <p:nvPr>
+            <p:ph idx="1"/>
+          </p:nvPr>
+        </p:nvSpPr>
+        <p:spPr/>
+        <p:txBody>
+          <a:bodyPr/>
+          <a:lstStyle/>
+          <a:p>
+            <a:r>
+              <a:rPr lang="en-GB" sz="1800" dirty="0"/>
+              <a:t>Large scale data processing was difficult! </a:t>
+            </a:r>
+            <a:endParaRPr lang="en-GB" sz="1800" dirty="0" smtClean="0"/>
+          </a:p>
+          <a:p>
+            <a:pPr lvl="1"/>
+            <a:r>
+              <a:rPr lang="en-GB" dirty="0" smtClean="0"/>
+              <a:t>Managing </a:t>
+            </a:r>
+            <a:r>
+              <a:rPr lang="en-GB" dirty="0"/>
+              <a:t>hundreds or thousands of processors </a:t>
+            </a:r>
+          </a:p>
+          <a:p>
+            <a:pPr lvl="1"/>
+            <a:r>
+              <a:rPr lang="en-GB" dirty="0"/>
+              <a:t>Managing parallelization and distribution </a:t>
+            </a:r>
+          </a:p>
+          <a:p>
+            <a:pPr lvl="1"/>
+            <a:r>
+              <a:rPr lang="en-GB" dirty="0"/>
+              <a:t>I/O Scheduling Status and monitoring </a:t>
+            </a:r>
+          </a:p>
+          <a:p>
+            <a:pPr lvl="1"/>
+            <a:r>
+              <a:rPr lang="en-GB" dirty="0" smtClean="0"/>
+              <a:t>Fault/crash tolerance</a:t>
+            </a:r>
+          </a:p>
+          <a:p>
+            <a:pPr lvl="1"/>
+            <a:endParaRPr lang="en-GB" dirty="0" smtClean="0"/>
+          </a:p>
+          <a:p>
+            <a:r>
+              <a:rPr lang="en-GB" sz="1800" dirty="0" err="1" smtClean="0"/>
+              <a:t>MapReduce</a:t>
+            </a:r>
+            <a:r>
+              <a:rPr lang="en-GB" sz="1800" dirty="0" smtClean="0"/>
+              <a:t> </a:t>
+            </a:r>
+            <a:r>
+              <a:rPr lang="en-GB" sz="1800" dirty="0"/>
+              <a:t>provides all of these, easily!</a:t>
+            </a:r>
+          </a:p>
+          <a:p>
+            <a:pPr lvl="1"/>
+            <a:endParaRPr lang="en-GB" dirty="0" smtClean="0"/>
+          </a:p>
+        </p:txBody>
+      </p:sp>
+      <p:pic>
+        <p:nvPicPr>
+          <p:cNvPr id="8" name="Imagem 7"/>
+          <p:cNvPicPr>
+            <a:picLocks noChangeAspect="1"/>
+          </p:cNvPicPr>
+          <p:nvPr/>
+        </p:nvPicPr>
+        <p:blipFill>
+          <a:blip r:embed="rId2">
+            <a:extLst>
+              <a:ext uri="{28A0092B-C50C-407E-A947-70E740481C1C}">
+                <a14:useLocalDpi xmlns:a14="http://schemas.microsoft.com/office/drawing/2010/main" val="0"/>
+              </a:ext>
+            </a:extLst>
+          </a:blip>
+          <a:stretch>
+            <a:fillRect/>
+          </a:stretch>
+        </p:blipFill>
+        <p:spPr>
+          <a:xfrm>
+            <a:off x="6753225" y="2923964"/>
+            <a:ext cx="4879975" cy="3663805"/>
+          </a:xfrm>
+          <a:prstGeom prst="rect">
+            <a:avLst/>
+          </a:prstGeom>
+        </p:spPr>
+      </p:pic>
+    </p:spTree>
+    <p:extLst>
+      <p:ext uri="{BB962C8B-B14F-4D97-AF65-F5344CB8AC3E}">
+        <p14:creationId xmlns:p14="http://schemas.microsoft.com/office/powerpoint/2010/main" val="1954382101"/>
+      </p:ext>
+    </p:extLst>
+  </p:cSld>
+  <p:clrMapOvr>
+    <a:masterClrMapping/>
+  </p:clrMapOvr>
+  <p:timing>
+    <p:tnLst>
+      <p:par>
+        <p:cTn id="1" dur="indefinite" restart="never" nodeType="tmRoot"/>
+      </p:par>
+    </p:tnLst>
+  </p:timing>
+</p:sld>
+</file>
+
+<file path=ppt/slides/slide3.xml><?xml version="1.0" encoding="utf-8"?>
+<p:sld xmlns:a="http://schemas.openxmlformats.org/drawingml/2006/main" xmlns:r="http://schemas.openxmlformats.org/officeDocument/2006/relationships" xmlns:p="http://schemas.openxmlformats.org/presentationml/2006/main">
+  <p:cSld>
+    <p:spTree>
+      <p:nvGrpSpPr>
+        <p:cNvPr id="1" name=""/>
+        <p:cNvGrpSpPr/>
+        <p:nvPr/>
+      </p:nvGrpSpPr>
+      <p:grpSpPr>
+        <a:xfrm>
+          <a:off x="0" y="0"/>
+          <a:ext cx="0" cy="0"/>
+          <a:chOff x="0" y="0"/>
+          <a:chExt cx="0" cy="0"/>
+        </a:xfrm>
+      </p:grpSpPr>
+      <p:sp>
+        <p:nvSpPr>
+          <p:cNvPr id="2" name="Título 1"/>
+          <p:cNvSpPr>
+            <a:spLocks noGrp="1"/>
+          </p:cNvSpPr>
+          <p:nvPr>
+            <p:ph type="title"/>
+          </p:nvPr>
+        </p:nvSpPr>
+        <p:spPr/>
+        <p:txBody>
+          <a:bodyPr/>
+          <a:lstStyle/>
+          <a:p>
+            <a:pPr algn="ctr"/>
+            <a:r>
+              <a:rPr lang="pt-PT" dirty="0" err="1" smtClean="0"/>
+              <a:t>What</a:t>
+            </a:r>
+            <a:r>
+              <a:rPr lang="pt-PT" dirty="0" smtClean="0"/>
+              <a:t> </a:t>
+            </a:r>
+            <a:r>
+              <a:rPr lang="pt-PT" dirty="0" err="1" smtClean="0"/>
+              <a:t>is</a:t>
+            </a:r>
+            <a:r>
+              <a:rPr lang="pt-PT" dirty="0" smtClean="0"/>
+              <a:t> </a:t>
+            </a:r>
+            <a:r>
+              <a:rPr lang="pt-PT" dirty="0" err="1" smtClean="0"/>
+              <a:t>MapReduce</a:t>
+            </a:r>
+            <a:r>
+              <a:rPr lang="pt-PT" dirty="0" smtClean="0"/>
+              <a:t>?</a:t>
+            </a:r>
+            <a:endParaRPr lang="pt-PT" dirty="0"/>
+          </a:p>
+        </p:txBody>
+      </p:sp>
+      <p:sp>
+        <p:nvSpPr>
+          <p:cNvPr id="3" name="Marcador de Posição de Conteúdo 2"/>
+          <p:cNvSpPr>
+            <a:spLocks noGrp="1"/>
+          </p:cNvSpPr>
+          <p:nvPr>
+            <p:ph idx="1"/>
+          </p:nvPr>
+        </p:nvSpPr>
+        <p:spPr/>
+        <p:txBody>
+          <a:bodyPr>
+            <a:normAutofit fontScale="92500" lnSpcReduction="20000"/>
+          </a:bodyPr>
+          <a:lstStyle/>
+          <a:p>
+            <a:r>
+              <a:rPr lang="en-US" dirty="0" err="1"/>
+              <a:t>MapReduce</a:t>
+            </a:r>
+            <a:r>
+              <a:rPr lang="en-US" dirty="0"/>
+              <a:t> is a programming </a:t>
+            </a:r>
+            <a:r>
+              <a:rPr lang="en-US" dirty="0" smtClean="0"/>
+              <a:t>model</a:t>
+            </a:r>
+            <a:r>
+              <a:rPr lang="en-US" dirty="0"/>
+              <a:t>, inspired by the map and reduce </a:t>
+            </a:r>
+            <a:r>
+              <a:rPr lang="en-US" dirty="0" smtClean="0"/>
+              <a:t>functions, </a:t>
+            </a:r>
+            <a:r>
+              <a:rPr lang="en-US" dirty="0"/>
+              <a:t>and an associated implementation for processing and generating large data sets with a parallel, distributed algorithm on a cluster</a:t>
+            </a:r>
+            <a:r>
+              <a:rPr lang="en-US" dirty="0" smtClean="0"/>
+              <a:t>. Between the two main steps there is an extra one called shuffle.</a:t>
+            </a:r>
+          </a:p>
+          <a:p>
+            <a:endParaRPr lang="en-US" dirty="0" smtClean="0"/>
+          </a:p>
+          <a:p>
+            <a:r>
+              <a:rPr lang="pt-PT" dirty="0" err="1" smtClean="0"/>
+              <a:t>The</a:t>
+            </a:r>
+            <a:r>
+              <a:rPr lang="pt-PT" dirty="0" smtClean="0"/>
+              <a:t> </a:t>
+            </a:r>
+            <a:r>
+              <a:rPr lang="en-US" dirty="0" smtClean="0"/>
+              <a:t>Map</a:t>
+            </a:r>
+            <a:r>
+              <a:rPr lang="pt-PT" dirty="0" smtClean="0"/>
+              <a:t> </a:t>
+            </a:r>
+            <a:r>
+              <a:rPr lang="pt-PT" dirty="0" err="1" smtClean="0"/>
+              <a:t>function</a:t>
+            </a:r>
+            <a:r>
+              <a:rPr lang="pt-PT" dirty="0" smtClean="0"/>
+              <a:t> </a:t>
+            </a:r>
+            <a:r>
+              <a:rPr lang="pt-PT" dirty="0" err="1"/>
+              <a:t>performs</a:t>
+            </a:r>
+            <a:r>
+              <a:rPr lang="pt-PT" dirty="0"/>
+              <a:t> </a:t>
+            </a:r>
+            <a:r>
+              <a:rPr lang="pt-PT" dirty="0" err="1"/>
+              <a:t>filtering</a:t>
+            </a:r>
+            <a:r>
+              <a:rPr lang="pt-PT" dirty="0"/>
+              <a:t> </a:t>
+            </a:r>
+            <a:r>
+              <a:rPr lang="pt-PT" dirty="0" err="1"/>
+              <a:t>and</a:t>
+            </a:r>
+            <a:r>
+              <a:rPr lang="pt-PT" dirty="0"/>
+              <a:t> </a:t>
+            </a:r>
+            <a:r>
+              <a:rPr lang="pt-PT" dirty="0" err="1" smtClean="0"/>
+              <a:t>sorting</a:t>
+            </a:r>
+            <a:r>
+              <a:rPr lang="pt-PT" dirty="0" smtClean="0"/>
+              <a:t> </a:t>
+            </a:r>
+            <a:r>
+              <a:rPr lang="pt-PT" dirty="0" err="1" smtClean="0"/>
+              <a:t>by</a:t>
+            </a:r>
+            <a:r>
+              <a:rPr lang="pt-PT" dirty="0" smtClean="0"/>
+              <a:t> </a:t>
+            </a:r>
+            <a:r>
+              <a:rPr lang="en-US" dirty="0" smtClean="0"/>
+              <a:t>processing a key/value </a:t>
+            </a:r>
+            <a:r>
+              <a:rPr lang="en-US" dirty="0"/>
+              <a:t>pair to generate a set of intermediate </a:t>
+            </a:r>
+            <a:r>
+              <a:rPr lang="en-US" dirty="0" smtClean="0"/>
+              <a:t>key/value pairs.</a:t>
+            </a:r>
+          </a:p>
+          <a:p>
+            <a:endParaRPr lang="en-US" dirty="0" smtClean="0"/>
+          </a:p>
+          <a:p>
+            <a:r>
+              <a:rPr lang="en-US" dirty="0" smtClean="0"/>
+              <a:t>The Reduce function </a:t>
+            </a:r>
+            <a:r>
+              <a:rPr lang="pt-PT" dirty="0" err="1"/>
+              <a:t>that</a:t>
+            </a:r>
+            <a:r>
+              <a:rPr lang="pt-PT" dirty="0"/>
+              <a:t> </a:t>
+            </a:r>
+            <a:r>
+              <a:rPr lang="pt-PT" dirty="0" err="1"/>
+              <a:t>performs</a:t>
+            </a:r>
+            <a:r>
+              <a:rPr lang="pt-PT" dirty="0"/>
+              <a:t> a </a:t>
+            </a:r>
+            <a:r>
+              <a:rPr lang="pt-PT" dirty="0" err="1"/>
+              <a:t>summary</a:t>
+            </a:r>
+            <a:r>
+              <a:rPr lang="pt-PT" dirty="0"/>
+              <a:t> </a:t>
+            </a:r>
+            <a:r>
+              <a:rPr lang="pt-PT" dirty="0" err="1" smtClean="0"/>
+              <a:t>operation</a:t>
+            </a:r>
+            <a:r>
+              <a:rPr lang="pt-PT" dirty="0" smtClean="0"/>
+              <a:t> </a:t>
+            </a:r>
+            <a:r>
+              <a:rPr lang="pt-PT" dirty="0" err="1" smtClean="0"/>
+              <a:t>and</a:t>
+            </a:r>
+            <a:r>
+              <a:rPr lang="pt-PT" dirty="0" smtClean="0"/>
+              <a:t> </a:t>
+            </a:r>
+            <a:r>
+              <a:rPr lang="en-US" dirty="0"/>
+              <a:t>merges all </a:t>
+            </a:r>
+            <a:r>
+              <a:rPr lang="en-US" dirty="0" smtClean="0"/>
+              <a:t>intermediate values </a:t>
+            </a:r>
+            <a:r>
+              <a:rPr lang="en-US" dirty="0"/>
+              <a:t>associated with the same intermediate </a:t>
+            </a:r>
+            <a:r>
+              <a:rPr lang="en-US" dirty="0" smtClean="0"/>
+              <a:t>key.</a:t>
+            </a:r>
+          </a:p>
+          <a:p>
+            <a:endParaRPr lang="en-US" dirty="0"/>
+          </a:p>
+          <a:p>
+            <a:r>
+              <a:rPr lang="en-US" dirty="0" smtClean="0"/>
+              <a:t>The shuffle function </a:t>
+            </a:r>
+            <a:r>
+              <a:rPr lang="en-GB" dirty="0"/>
+              <a:t> </a:t>
+            </a:r>
+            <a:r>
+              <a:rPr lang="en-GB" dirty="0" smtClean="0"/>
+              <a:t>redistributes </a:t>
+            </a:r>
+            <a:r>
+              <a:rPr lang="en-GB" dirty="0"/>
+              <a:t>data based on the output keys (produced by the </a:t>
+            </a:r>
+            <a:r>
+              <a:rPr lang="en-GB" dirty="0" smtClean="0"/>
+              <a:t>Map function</a:t>
+            </a:r>
+            <a:r>
+              <a:rPr lang="en-GB" dirty="0"/>
+              <a:t>), such that all data belonging to one key is located on the same worker </a:t>
+            </a:r>
+            <a:r>
+              <a:rPr lang="en-GB" dirty="0" smtClean="0"/>
+              <a:t>node.</a:t>
+            </a:r>
+            <a:endParaRPr lang="en-US" dirty="0" smtClean="0"/>
+          </a:p>
+          <a:p>
+            <a:endParaRPr lang="pt-PT" dirty="0"/>
+          </a:p>
+        </p:txBody>
+      </p:sp>
+    </p:spTree>
+    <p:extLst>
+      <p:ext uri="{BB962C8B-B14F-4D97-AF65-F5344CB8AC3E}">
+        <p14:creationId xmlns:p14="http://schemas.microsoft.com/office/powerpoint/2010/main" val="104844528"/>
+      </p:ext>
+    </p:extLst>
+  </p:cSld>
+  <p:clrMapOvr>
+    <a:masterClrMapping/>
+  </p:clrMapOvr>
+  <p:timing>
+    <p:tnLst>
+      <p:par>
+        <p:cTn id="1" dur="indefinite" restart="never" nodeType="tmRoot"/>
+      </p:par>
+    </p:tnLst>
+  </p:timing>
+</p:sld>
+</file>
+
+<file path=ppt/slides/slide4.xml><?xml version="1.0" encoding="utf-8"?>
+<p:sld xmlns:a="http://schemas.openxmlformats.org/drawingml/2006/main" xmlns:r="http://schemas.openxmlformats.org/officeDocument/2006/relationships" xmlns:p="http://schemas.openxmlformats.org/presentationml/2006/main">
+  <p:cSld>
+    <p:spTree>
+      <p:nvGrpSpPr>
+        <p:cNvPr id="1" name=""/>
+        <p:cNvGrpSpPr/>
+        <p:nvPr/>
+      </p:nvGrpSpPr>
+      <p:grpSpPr>
+        <a:xfrm>
+          <a:off x="0" y="0"/>
+          <a:ext cx="0" cy="0"/>
+          <a:chOff x="0" y="0"/>
+          <a:chExt cx="0" cy="0"/>
+        </a:xfrm>
+      </p:grpSpPr>
+      <p:sp>
+        <p:nvSpPr>
+          <p:cNvPr id="7" name="Marcador de Posição do Texto 6"/>
+          <p:cNvSpPr>
+            <a:spLocks noGrp="1"/>
+          </p:cNvSpPr>
+          <p:nvPr>
+            <p:ph type="body" sz="quarter" idx="3"/>
+          </p:nvPr>
+        </p:nvSpPr>
+        <p:spPr>
+          <a:xfrm>
+            <a:off x="3508195" y="228600"/>
+            <a:ext cx="4396339" cy="576262"/>
+          </a:xfrm>
+        </p:spPr>
+        <p:txBody>
+          <a:bodyPr/>
+          <a:lstStyle/>
+          <a:p>
+            <a:pPr algn="ctr"/>
+            <a:r>
+              <a:rPr lang="pt-PT" sz="4200" dirty="0" err="1" smtClean="0">
+                <a:solidFill>
+                  <a:schemeClr val="tx1"/>
+                </a:solidFill>
+              </a:rPr>
+              <a:t>MapReduce</a:t>
+            </a:r>
+            <a:endParaRPr lang="en-GB" sz="4200" dirty="0">
+              <a:solidFill>
+                <a:schemeClr val="tx1"/>
+              </a:solidFill>
+            </a:endParaRPr>
+          </a:p>
+        </p:txBody>
+      </p:sp>
+      <p:sp>
+        <p:nvSpPr>
+          <p:cNvPr id="11" name="CaixaDeTexto 10"/>
+          <p:cNvSpPr txBox="1"/>
+          <p:nvPr/>
+        </p:nvSpPr>
+        <p:spPr>
+          <a:xfrm>
+            <a:off x="981964" y="5473700"/>
+            <a:ext cx="4724400" cy="369332"/>
+          </a:xfrm>
+          <a:prstGeom prst="rect">
+            <a:avLst/>
+          </a:prstGeom>
+          <a:noFill/>
+        </p:spPr>
+        <p:txBody>
+          <a:bodyPr wrap="square" rtlCol="0">
+            <a:spAutoFit/>
+          </a:bodyPr>
+          <a:lstStyle/>
+          <a:p>
+            <a:pPr algn="ctr"/>
+            <a:r>
+              <a:rPr lang="pt-PT" dirty="0" err="1" smtClean="0"/>
+              <a:t>Simple</a:t>
+            </a:r>
+            <a:r>
+              <a:rPr lang="pt-PT" dirty="0" smtClean="0"/>
+              <a:t> </a:t>
+            </a:r>
+            <a:r>
+              <a:rPr lang="pt-PT" dirty="0" err="1" smtClean="0"/>
+              <a:t>MapReduce</a:t>
+            </a:r>
+            <a:endParaRPr lang="en-GB" dirty="0"/>
+          </a:p>
+        </p:txBody>
+      </p:sp>
+      <p:sp>
+        <p:nvSpPr>
+          <p:cNvPr id="12" name="CaixaDeTexto 11"/>
+          <p:cNvSpPr txBox="1"/>
+          <p:nvPr/>
+        </p:nvSpPr>
+        <p:spPr>
+          <a:xfrm>
+            <a:off x="6732586" y="5843032"/>
+            <a:ext cx="4724400" cy="369332"/>
+          </a:xfrm>
+          <a:prstGeom prst="rect">
+            <a:avLst/>
+          </a:prstGeom>
+          <a:noFill/>
+        </p:spPr>
+        <p:txBody>
+          <a:bodyPr wrap="square" rtlCol="0">
+            <a:spAutoFit/>
+          </a:bodyPr>
+          <a:lstStyle/>
+          <a:p>
+            <a:pPr algn="ctr"/>
+            <a:r>
+              <a:rPr lang="pt-PT" dirty="0" err="1" smtClean="0"/>
+              <a:t>MapReduce</a:t>
+            </a:r>
+            <a:r>
+              <a:rPr lang="pt-PT" dirty="0"/>
+              <a:t> </a:t>
+            </a:r>
+            <a:r>
+              <a:rPr lang="pt-PT" dirty="0" err="1" smtClean="0"/>
+              <a:t>using</a:t>
+            </a:r>
+            <a:r>
+              <a:rPr lang="pt-PT" dirty="0" smtClean="0"/>
+              <a:t> combine</a:t>
+            </a:r>
+            <a:endParaRPr lang="en-GB" dirty="0"/>
+          </a:p>
+        </p:txBody>
+      </p:sp>
+      <p:pic>
+        <p:nvPicPr>
+          <p:cNvPr id="14" name="Marcador de Posição de Conteúdo 13"/>
+          <p:cNvPicPr>
+            <a:picLocks noGrp="1" noChangeAspect="1"/>
+          </p:cNvPicPr>
+          <p:nvPr>
+            <p:ph sz="half" idx="2"/>
+          </p:nvPr>
+        </p:nvPicPr>
+        <p:blipFill>
+          <a:blip r:embed="rId2">
+            <a:extLst>
+              <a:ext uri="{28A0092B-C50C-407E-A947-70E740481C1C}">
+                <a14:useLocalDpi xmlns:a14="http://schemas.microsoft.com/office/drawing/2010/main" val="0"/>
+              </a:ext>
+            </a:extLst>
+          </a:blip>
+          <a:stretch>
+            <a:fillRect/>
+          </a:stretch>
+        </p:blipFill>
+        <p:spPr>
+          <a:xfrm>
+            <a:off x="555330" y="1665298"/>
+            <a:ext cx="5578770" cy="3569395"/>
+          </a:xfrm>
+        </p:spPr>
+      </p:pic>
+      <p:pic>
+        <p:nvPicPr>
+          <p:cNvPr id="16" name="Marcador de Posição de Conteúdo 15"/>
+          <p:cNvPicPr>
+            <a:picLocks noGrp="1" noChangeAspect="1"/>
+          </p:cNvPicPr>
+          <p:nvPr>
+            <p:ph sz="quarter" idx="4"/>
+          </p:nvPr>
+        </p:nvPicPr>
+        <p:blipFill>
+          <a:blip r:embed="rId3">
+            <a:extLst>
+              <a:ext uri="{28A0092B-C50C-407E-A947-70E740481C1C}">
+                <a14:useLocalDpi xmlns:a14="http://schemas.microsoft.com/office/drawing/2010/main" val="0"/>
+              </a:ext>
+            </a:extLst>
+          </a:blip>
+          <a:stretch>
+            <a:fillRect/>
+          </a:stretch>
+        </p:blipFill>
+        <p:spPr>
+          <a:xfrm>
+            <a:off x="6454774" y="1665298"/>
+            <a:ext cx="5280025" cy="3906831"/>
+          </a:xfrm>
+        </p:spPr>
+      </p:pic>
+    </p:spTree>
+    <p:extLst>
+      <p:ext uri="{BB962C8B-B14F-4D97-AF65-F5344CB8AC3E}">
+        <p14:creationId xmlns:p14="http://schemas.microsoft.com/office/powerpoint/2010/main" val="370236117"/>
+      </p:ext>
+    </p:extLst>
+  </p:cSld>
+  <p:clrMapOvr>
+    <a:masterClrMapping/>
+  </p:clrMapOvr>
+  <p:timing>
+    <p:tnLst>
+      <p:par>
+        <p:cTn id="1" dur="indefinite" restart="never" nodeType="tmRoot"/>
+      </p:par>
+    </p:tnLst>
+  </p:timing>
+</p:sld>
+</file>
+
+<file path=ppt/slides/slide5.xml><?xml version="1.0" encoding="utf-8"?>
+<p:sld xmlns:a="http://schemas.openxmlformats.org/drawingml/2006/main" xmlns:r="http://schemas.openxmlformats.org/officeDocument/2006/relationships" xmlns:p="http://schemas.openxmlformats.org/presentationml/2006/main">
+  <p:cSld>
+    <p:spTree>
+      <p:nvGrpSpPr>
+        <p:cNvPr id="1" name=""/>
+        <p:cNvGrpSpPr/>
+        <p:nvPr/>
+      </p:nvGrpSpPr>
+      <p:grpSpPr>
+        <a:xfrm>
+          <a:off x="0" y="0"/>
+          <a:ext cx="0" cy="0"/>
+          <a:chOff x="0" y="0"/>
+          <a:chExt cx="0" cy="0"/>
+        </a:xfrm>
+      </p:grpSpPr>
+      <p:sp>
+        <p:nvSpPr>
+          <p:cNvPr id="2" name="Título 1"/>
+          <p:cNvSpPr>
+            <a:spLocks noGrp="1"/>
+          </p:cNvSpPr>
+          <p:nvPr>
+            <p:ph type="title"/>
+          </p:nvPr>
+        </p:nvSpPr>
+        <p:spPr/>
+        <p:txBody>
+          <a:bodyPr/>
+          <a:lstStyle/>
+          <a:p>
+            <a:pPr algn="ctr"/>
+            <a:r>
+              <a:rPr lang="pt-PT" dirty="0" err="1" smtClean="0"/>
+              <a:t>MapReduce</a:t>
+            </a:r>
+            <a:r>
+              <a:rPr lang="pt-PT" dirty="0" smtClean="0"/>
+              <a:t> </a:t>
+            </a:r>
+            <a:r>
+              <a:rPr lang="pt-PT" dirty="0" err="1" smtClean="0"/>
+              <a:t>features</a:t>
+            </a:r>
+            <a:r>
+              <a:rPr lang="pt-PT" dirty="0" smtClean="0"/>
+              <a:t>/</a:t>
+            </a:r>
+            <a:r>
+              <a:rPr lang="pt-PT" dirty="0" err="1" smtClean="0"/>
+              <a:t>benefits</a:t>
+            </a:r>
+            <a:endParaRPr lang="pt-PT" dirty="0"/>
+          </a:p>
+        </p:txBody>
+      </p:sp>
+      <p:sp>
+        <p:nvSpPr>
+          <p:cNvPr id="3" name="Marcador de Posição de Conteúdo 2"/>
+          <p:cNvSpPr>
+            <a:spLocks noGrp="1"/>
+          </p:cNvSpPr>
+          <p:nvPr>
+            <p:ph idx="1"/>
+          </p:nvPr>
+        </p:nvSpPr>
+        <p:spPr/>
+        <p:txBody>
+          <a:bodyPr>
+            <a:normAutofit/>
+          </a:bodyPr>
+          <a:lstStyle/>
+          <a:p>
+            <a:r>
+              <a:rPr lang="en-US" dirty="0" smtClean="0"/>
+              <a:t>In multi-threaded implementations of </a:t>
+            </a:r>
+            <a:r>
+              <a:rPr lang="en-US" dirty="0" err="1" smtClean="0"/>
+              <a:t>MapReduce</a:t>
+            </a:r>
+            <a:r>
+              <a:rPr lang="en-US" dirty="0" smtClean="0"/>
+              <a:t> the </a:t>
+            </a:r>
+            <a:r>
+              <a:rPr lang="pt-PT" dirty="0" err="1" smtClean="0"/>
+              <a:t>scalability</a:t>
+            </a:r>
+            <a:r>
+              <a:rPr lang="pt-PT" dirty="0" smtClean="0"/>
+              <a:t>, </a:t>
+            </a:r>
+            <a:r>
+              <a:rPr lang="pt-PT" dirty="0" err="1" smtClean="0"/>
+              <a:t>fault-tolerance</a:t>
+            </a:r>
+            <a:r>
+              <a:rPr lang="pt-PT" dirty="0" smtClean="0"/>
+              <a:t> </a:t>
+            </a:r>
+            <a:r>
+              <a:rPr lang="pt-PT" dirty="0" err="1" smtClean="0"/>
+              <a:t>and</a:t>
+            </a:r>
+            <a:r>
+              <a:rPr lang="pt-PT" dirty="0" smtClean="0"/>
+              <a:t> performance </a:t>
+            </a:r>
+            <a:r>
+              <a:rPr lang="pt-PT" dirty="0" err="1" smtClean="0"/>
+              <a:t>of</a:t>
+            </a:r>
+            <a:r>
+              <a:rPr lang="pt-PT" dirty="0" smtClean="0"/>
+              <a:t> </a:t>
+            </a:r>
+            <a:r>
+              <a:rPr lang="pt-PT" dirty="0" err="1" smtClean="0"/>
+              <a:t>the</a:t>
+            </a:r>
+            <a:r>
+              <a:rPr lang="pt-PT" dirty="0" smtClean="0"/>
+              <a:t> </a:t>
+            </a:r>
+            <a:r>
+              <a:rPr lang="pt-PT" dirty="0" err="1" smtClean="0"/>
+              <a:t>program</a:t>
+            </a:r>
+            <a:r>
+              <a:rPr lang="pt-PT" dirty="0" smtClean="0"/>
+              <a:t> are </a:t>
+            </a:r>
+            <a:r>
+              <a:rPr lang="pt-PT" dirty="0" err="1" smtClean="0"/>
+              <a:t>largely</a:t>
+            </a:r>
+            <a:r>
+              <a:rPr lang="pt-PT" dirty="0" smtClean="0"/>
+              <a:t> </a:t>
+            </a:r>
+            <a:r>
+              <a:rPr lang="pt-PT" dirty="0" err="1" smtClean="0"/>
+              <a:t>increased</a:t>
+            </a:r>
+            <a:r>
+              <a:rPr lang="pt-PT" dirty="0" smtClean="0"/>
+              <a:t> </a:t>
+            </a:r>
+            <a:r>
+              <a:rPr lang="pt-PT" dirty="0" err="1" smtClean="0"/>
+              <a:t>when</a:t>
+            </a:r>
+            <a:r>
+              <a:rPr lang="pt-PT" dirty="0" smtClean="0"/>
+              <a:t> </a:t>
+            </a:r>
+            <a:r>
+              <a:rPr lang="pt-PT" dirty="0" err="1" smtClean="0"/>
+              <a:t>compared</a:t>
+            </a:r>
+            <a:r>
+              <a:rPr lang="pt-PT" dirty="0" smtClean="0"/>
+              <a:t> </a:t>
+            </a:r>
+            <a:r>
+              <a:rPr lang="pt-PT" dirty="0" err="1" smtClean="0"/>
+              <a:t>with</a:t>
+            </a:r>
+            <a:r>
+              <a:rPr lang="pt-PT" dirty="0" smtClean="0"/>
+              <a:t> single-</a:t>
+            </a:r>
+            <a:r>
+              <a:rPr lang="pt-PT" dirty="0" err="1" smtClean="0"/>
+              <a:t>threaded</a:t>
+            </a:r>
+            <a:r>
+              <a:rPr lang="pt-PT" dirty="0" smtClean="0"/>
+              <a:t> </a:t>
+            </a:r>
+            <a:r>
+              <a:rPr lang="pt-PT" dirty="0" err="1" smtClean="0"/>
+              <a:t>implementations</a:t>
+            </a:r>
+            <a:r>
+              <a:rPr lang="pt-PT" dirty="0" smtClean="0"/>
+              <a:t> </a:t>
+            </a:r>
+            <a:r>
+              <a:rPr lang="pt-PT" dirty="0" err="1" smtClean="0"/>
+              <a:t>of</a:t>
+            </a:r>
+            <a:r>
+              <a:rPr lang="pt-PT" dirty="0" smtClean="0"/>
+              <a:t> </a:t>
+            </a:r>
+            <a:r>
+              <a:rPr lang="pt-PT" dirty="0" err="1" smtClean="0"/>
+              <a:t>MapReduce</a:t>
+            </a:r>
+            <a:r>
+              <a:rPr lang="pt-PT" dirty="0" smtClean="0"/>
+              <a:t> </a:t>
+            </a:r>
+            <a:r>
+              <a:rPr lang="pt-PT" dirty="0" err="1" smtClean="0"/>
+              <a:t>or</a:t>
+            </a:r>
+            <a:r>
+              <a:rPr lang="pt-PT" dirty="0" smtClean="0"/>
+              <a:t> non-</a:t>
+            </a:r>
+            <a:r>
+              <a:rPr lang="pt-PT" dirty="0" err="1"/>
+              <a:t>M</a:t>
+            </a:r>
+            <a:r>
+              <a:rPr lang="pt-PT" dirty="0" err="1" smtClean="0"/>
+              <a:t>apReduce</a:t>
+            </a:r>
+            <a:r>
+              <a:rPr lang="pt-PT" dirty="0" smtClean="0"/>
+              <a:t>.</a:t>
+            </a:r>
+            <a:endParaRPr lang="en-US" dirty="0" smtClean="0"/>
+          </a:p>
+          <a:p>
+            <a:r>
+              <a:rPr lang="en-US" dirty="0" err="1" smtClean="0"/>
+              <a:t>MapReduce</a:t>
+            </a:r>
+            <a:r>
+              <a:rPr lang="en-US" dirty="0" smtClean="0"/>
+              <a:t> programs are </a:t>
+            </a:r>
+            <a:r>
+              <a:rPr lang="en-US" dirty="0"/>
+              <a:t>automatically parallelized and executed on a large </a:t>
+            </a:r>
+            <a:r>
+              <a:rPr lang="en-US" dirty="0" smtClean="0"/>
+              <a:t>cluster. </a:t>
+            </a:r>
+            <a:r>
+              <a:rPr lang="en-US" dirty="0"/>
+              <a:t>The run-time system takes care of </a:t>
+            </a:r>
+            <a:r>
+              <a:rPr lang="en-US" dirty="0" smtClean="0"/>
+              <a:t>the details </a:t>
+            </a:r>
+            <a:r>
+              <a:rPr lang="en-US" dirty="0"/>
+              <a:t>of partitioning the input data, scheduling the program' s execution across a set of machines, handling machine failures, and managing the required </a:t>
+            </a:r>
+            <a:r>
+              <a:rPr lang="en-US" dirty="0" smtClean="0"/>
+              <a:t>inter-machine communication</a:t>
+            </a:r>
+            <a:r>
+              <a:rPr lang="en-US" dirty="0"/>
+              <a:t>. </a:t>
+            </a:r>
+            <a:endParaRPr lang="en-US" dirty="0" smtClean="0"/>
+          </a:p>
+          <a:p>
+            <a:r>
+              <a:rPr lang="en-US" dirty="0" smtClean="0"/>
+              <a:t>This </a:t>
+            </a:r>
+            <a:r>
+              <a:rPr lang="en-US" dirty="0"/>
+              <a:t>allows programmers without </a:t>
+            </a:r>
+            <a:r>
+              <a:rPr lang="en-US" dirty="0" smtClean="0"/>
+              <a:t>any experience </a:t>
+            </a:r>
+            <a:r>
+              <a:rPr lang="en-US" dirty="0"/>
+              <a:t>with parallel and distributed systems to easily utilize the resources of a large distributed system</a:t>
+            </a:r>
+            <a:endParaRPr lang="pt-PT" dirty="0"/>
+          </a:p>
+        </p:txBody>
+      </p:sp>
+    </p:spTree>
+    <p:extLst>
+      <p:ext uri="{BB962C8B-B14F-4D97-AF65-F5344CB8AC3E}">
+        <p14:creationId xmlns:p14="http://schemas.microsoft.com/office/powerpoint/2010/main" val="4057155545"/>
+      </p:ext>
+    </p:extLst>
+  </p:cSld>
+  <p:clrMapOvr>
+    <a:masterClrMapping/>
+  </p:clrMapOvr>
+  <p:timing>
+    <p:tnLst>
+      <p:par>
+        <p:cTn id="1" dur="indefinite" restart="never" nodeType="tmRoot"/>
+      </p:par>
+    </p:tnLst>
+  </p:timing>
+</p:sld>
+</file>
+
+<file path=ppt/slides/slide6.xml><?xml version="1.0" encoding="utf-8"?>
+<p:sld xmlns:a="http://schemas.openxmlformats.org/drawingml/2006/main" xmlns:r="http://schemas.openxmlformats.org/officeDocument/2006/relationships" xmlns:p="http://schemas.openxmlformats.org/presentationml/2006/main">
+  <p:cSld>
+    <p:spTree>
+      <p:nvGrpSpPr>
+        <p:cNvPr id="1" name=""/>
+        <p:cNvGrpSpPr/>
+        <p:nvPr/>
+      </p:nvGrpSpPr>
+      <p:grpSpPr>
+        <a:xfrm>
+          <a:off x="0" y="0"/>
+          <a:ext cx="0" cy="0"/>
+          <a:chOff x="0" y="0"/>
+          <a:chExt cx="0" cy="0"/>
+        </a:xfrm>
+      </p:grpSpPr>
+      <p:sp>
+        <p:nvSpPr>
+          <p:cNvPr id="2" name="Título 1"/>
+          <p:cNvSpPr>
+            <a:spLocks noGrp="1"/>
+          </p:cNvSpPr>
+          <p:nvPr>
+            <p:ph type="title"/>
+          </p:nvPr>
+        </p:nvSpPr>
+        <p:spPr/>
+        <p:txBody>
+          <a:bodyPr/>
+          <a:lstStyle/>
+          <a:p>
+            <a:pPr algn="ctr"/>
+            <a:r>
+              <a:rPr lang="pt-PT" dirty="0" err="1" smtClean="0"/>
+              <a:t>Programming</a:t>
+            </a:r>
+            <a:r>
+              <a:rPr lang="pt-PT" dirty="0" smtClean="0"/>
+              <a:t> </a:t>
+            </a:r>
+            <a:r>
+              <a:rPr lang="pt-PT" dirty="0" err="1" smtClean="0"/>
+              <a:t>model</a:t>
+            </a:r>
+            <a:endParaRPr lang="en-GB" dirty="0"/>
+          </a:p>
+        </p:txBody>
+      </p:sp>
+      <p:sp>
+        <p:nvSpPr>
+          <p:cNvPr id="3" name="Marcador de Posição de Conteúdo 2"/>
+          <p:cNvSpPr>
+            <a:spLocks noGrp="1"/>
+          </p:cNvSpPr>
+          <p:nvPr>
+            <p:ph idx="1"/>
+          </p:nvPr>
+        </p:nvSpPr>
+        <p:spPr/>
+        <p:txBody>
+          <a:bodyPr>
+            <a:normAutofit/>
+          </a:bodyPr>
+          <a:lstStyle/>
+          <a:p>
+            <a:r>
+              <a:rPr lang="pt-PT" dirty="0" smtClean="0"/>
+              <a:t>Input/</a:t>
+            </a:r>
+            <a:r>
+              <a:rPr lang="pt-PT" dirty="0"/>
+              <a:t> </a:t>
+            </a:r>
+            <a:r>
+              <a:rPr lang="pt-PT" dirty="0" smtClean="0"/>
+              <a:t>Output: </a:t>
+            </a:r>
+            <a:r>
+              <a:rPr lang="pt-PT" dirty="0" err="1"/>
+              <a:t>key</a:t>
+            </a:r>
+            <a:r>
+              <a:rPr lang="pt-PT" dirty="0"/>
+              <a:t>/</a:t>
+            </a:r>
+            <a:r>
+              <a:rPr lang="pt-PT" dirty="0" err="1"/>
+              <a:t>value</a:t>
+            </a:r>
+            <a:r>
+              <a:rPr lang="pt-PT" dirty="0"/>
+              <a:t> </a:t>
+            </a:r>
+            <a:r>
+              <a:rPr lang="pt-PT" dirty="0" err="1" smtClean="0"/>
+              <a:t>pairs</a:t>
+            </a:r>
+            <a:r>
+              <a:rPr lang="pt-PT" dirty="0" smtClean="0"/>
+              <a:t>.</a:t>
+            </a:r>
+          </a:p>
+          <a:p>
+            <a:r>
+              <a:rPr lang="en-GB" dirty="0"/>
+              <a:t>Map, </a:t>
+            </a:r>
+            <a:r>
+              <a:rPr lang="en-GB" dirty="0" smtClean="0"/>
+              <a:t>defined </a:t>
+            </a:r>
+            <a:r>
+              <a:rPr lang="en-GB" dirty="0"/>
+              <a:t>by the user, takes an input pair and produces a set of intermediate key/value pairs. The </a:t>
+            </a:r>
+            <a:r>
+              <a:rPr lang="en-GB" dirty="0" err="1"/>
+              <a:t>MapReduce</a:t>
+            </a:r>
+            <a:r>
+              <a:rPr lang="en-GB" dirty="0"/>
+              <a:t> library groups together all intermediate values associated with the same intermediate key </a:t>
+            </a:r>
+            <a:r>
+              <a:rPr lang="en-GB" dirty="0" smtClean="0"/>
+              <a:t>X </a:t>
+            </a:r>
+            <a:r>
+              <a:rPr lang="en-GB" dirty="0"/>
+              <a:t>and passes </a:t>
+            </a:r>
+            <a:r>
+              <a:rPr lang="en-GB" dirty="0" smtClean="0"/>
+              <a:t>them to </a:t>
+            </a:r>
+            <a:r>
+              <a:rPr lang="en-GB" dirty="0"/>
+              <a:t>the Reduce function</a:t>
+            </a:r>
+            <a:r>
+              <a:rPr lang="en-GB" dirty="0" smtClean="0"/>
+              <a:t>.</a:t>
+            </a:r>
+          </a:p>
+          <a:p>
+            <a:r>
+              <a:rPr lang="en-GB" dirty="0"/>
+              <a:t>The Reduce function, also </a:t>
+            </a:r>
+            <a:r>
+              <a:rPr lang="en-GB" dirty="0" smtClean="0"/>
+              <a:t>provided by </a:t>
+            </a:r>
+            <a:r>
+              <a:rPr lang="en-GB" dirty="0"/>
+              <a:t>the user, </a:t>
+            </a:r>
+            <a:r>
+              <a:rPr lang="en-GB" dirty="0" smtClean="0"/>
+              <a:t>accepts an </a:t>
+            </a:r>
+            <a:r>
+              <a:rPr lang="en-GB" dirty="0"/>
+              <a:t>intermediate key X</a:t>
+            </a:r>
+            <a:r>
+              <a:rPr lang="en-GB" dirty="0" smtClean="0"/>
+              <a:t> </a:t>
+            </a:r>
+            <a:r>
+              <a:rPr lang="en-GB" dirty="0"/>
+              <a:t>and a set of values for that key . </a:t>
+            </a:r>
+            <a:r>
+              <a:rPr lang="en-GB" dirty="0" smtClean="0"/>
+              <a:t>It merges </a:t>
+            </a:r>
+            <a:r>
+              <a:rPr lang="en-GB" dirty="0"/>
+              <a:t>together these values to form a possibly </a:t>
+            </a:r>
+            <a:r>
+              <a:rPr lang="en-GB" dirty="0" smtClean="0"/>
+              <a:t>smaller set </a:t>
+            </a:r>
+            <a:r>
+              <a:rPr lang="en-GB" dirty="0"/>
+              <a:t>of values. </a:t>
+            </a:r>
+            <a:r>
+              <a:rPr lang="en-GB" dirty="0" smtClean="0"/>
+              <a:t>Typically </a:t>
+            </a:r>
+            <a:r>
+              <a:rPr lang="en-GB" dirty="0"/>
+              <a:t>just zero or one output value </a:t>
+            </a:r>
+            <a:r>
+              <a:rPr lang="en-GB" dirty="0" smtClean="0"/>
+              <a:t>is produced </a:t>
+            </a:r>
+            <a:r>
+              <a:rPr lang="en-GB" dirty="0"/>
+              <a:t>per Reduce in vocation. The intermediate values are supplied to the user' s reduce function via an iterator . This </a:t>
+            </a:r>
+            <a:r>
+              <a:rPr lang="en-GB" dirty="0" smtClean="0"/>
+              <a:t>allows </a:t>
+            </a:r>
+            <a:r>
+              <a:rPr lang="en-GB" dirty="0"/>
+              <a:t>to handle lists of values that are </a:t>
+            </a:r>
+            <a:r>
+              <a:rPr lang="en-GB" dirty="0" smtClean="0"/>
+              <a:t>too large to fit </a:t>
+            </a:r>
+            <a:r>
+              <a:rPr lang="en-GB" dirty="0"/>
+              <a:t>in memory</a:t>
+            </a:r>
+          </a:p>
+        </p:txBody>
+      </p:sp>
+    </p:spTree>
+    <p:extLst>
+      <p:ext uri="{BB962C8B-B14F-4D97-AF65-F5344CB8AC3E}">
+        <p14:creationId xmlns:p14="http://schemas.microsoft.com/office/powerpoint/2010/main" val="3990928321"/>
+      </p:ext>
+    </p:extLst>
+  </p:cSld>
+  <p:clrMapOvr>
+    <a:masterClrMapping/>
+  </p:clrMapOvr>
+  <p:timing>
+    <p:tnLst>
+      <p:par>
+        <p:cTn id="1" dur="indefinite" restart="never" nodeType="tmRoot"/>
+      </p:par>
+    </p:tnLst>
+  </p:timing>
+</p:sld>
+</file>
+
+<file path=ppt/slides/slide7.xml><?xml version="1.0" encoding="utf-8"?>
+<p:sld xmlns:a="http://schemas.openxmlformats.org/drawingml/2006/main" xmlns:r="http://schemas.openxmlformats.org/officeDocument/2006/relationships" xmlns:p="http://schemas.openxmlformats.org/presentationml/2006/main">
+  <p:cSld>
+    <p:spTree>
+      <p:nvGrpSpPr>
+        <p:cNvPr id="1" name=""/>
+        <p:cNvGrpSpPr/>
+        <p:nvPr/>
+      </p:nvGrpSpPr>
+      <p:grpSpPr>
+        <a:xfrm>
+          <a:off x="0" y="0"/>
+          <a:ext cx="0" cy="0"/>
+          <a:chOff x="0" y="0"/>
+          <a:chExt cx="0" cy="0"/>
+        </a:xfrm>
+      </p:grpSpPr>
+      <p:sp>
+        <p:nvSpPr>
+          <p:cNvPr id="2" name="Título 1"/>
+          <p:cNvSpPr>
+            <a:spLocks noGrp="1"/>
+          </p:cNvSpPr>
+          <p:nvPr>
+            <p:ph type="title"/>
+          </p:nvPr>
+        </p:nvSpPr>
+        <p:spPr/>
+        <p:txBody>
+          <a:bodyPr/>
+          <a:lstStyle/>
+          <a:p>
+            <a:r>
+              <a:rPr lang="pt-PT" sz="4000" dirty="0" err="1" smtClean="0"/>
+              <a:t>Known</a:t>
+            </a:r>
+            <a:r>
+              <a:rPr lang="pt-PT" sz="4000" dirty="0" smtClean="0"/>
+              <a:t> </a:t>
+            </a:r>
+            <a:r>
+              <a:rPr lang="pt-PT" sz="4000" dirty="0" err="1" smtClean="0"/>
+              <a:t>MapReduce</a:t>
+            </a:r>
+            <a:r>
+              <a:rPr lang="pt-PT" sz="4000" dirty="0" smtClean="0"/>
+              <a:t> </a:t>
+            </a:r>
+            <a:r>
+              <a:rPr lang="pt-PT" sz="4000" dirty="0" err="1" smtClean="0"/>
+              <a:t>implementations</a:t>
+            </a:r>
+            <a:endParaRPr lang="en-GB" sz="4000" dirty="0"/>
+          </a:p>
+        </p:txBody>
+      </p:sp>
+      <p:sp>
+        <p:nvSpPr>
+          <p:cNvPr id="3" name="Marcador de Posição de Conteúdo 2"/>
+          <p:cNvSpPr>
+            <a:spLocks noGrp="1"/>
+          </p:cNvSpPr>
+          <p:nvPr>
+            <p:ph idx="1"/>
+          </p:nvPr>
+        </p:nvSpPr>
+        <p:spPr>
+          <a:xfrm>
+            <a:off x="989012" y="1493147"/>
+            <a:ext cx="8946541" cy="4195481"/>
+          </a:xfrm>
+        </p:spPr>
+        <p:txBody>
+          <a:bodyPr/>
+          <a:lstStyle/>
+          <a:p>
+            <a:r>
+              <a:rPr lang="en-GB" dirty="0"/>
+              <a:t>Apache </a:t>
+            </a:r>
+            <a:r>
+              <a:rPr lang="en-GB" dirty="0" smtClean="0"/>
+              <a:t>Hadoop</a:t>
+            </a:r>
+          </a:p>
+          <a:p>
+            <a:pPr lvl="1"/>
+            <a:r>
+              <a:rPr lang="en-GB" dirty="0"/>
+              <a:t>Apache Hadoop is an open-source software framework for distributed storage and distributed processing of Big Data on </a:t>
+            </a:r>
+            <a:r>
+              <a:rPr lang="en-GB" dirty="0" smtClean="0"/>
+              <a:t>clusters. </a:t>
+            </a:r>
+          </a:p>
+          <a:p>
+            <a:pPr lvl="1"/>
+            <a:r>
+              <a:rPr lang="en-GB" dirty="0" smtClean="0"/>
+              <a:t>Its </a:t>
+            </a:r>
+            <a:r>
+              <a:rPr lang="en-GB" dirty="0"/>
+              <a:t>Hadoop Distributed File System (HDFS) splits files into large blocks (default 64MB or 128MB) and distributes the blocks amongst the nodes in the cluster. </a:t>
+            </a:r>
+            <a:endParaRPr lang="en-GB" dirty="0" smtClean="0"/>
+          </a:p>
+          <a:p>
+            <a:pPr lvl="1"/>
+            <a:r>
+              <a:rPr lang="en-GB" dirty="0" smtClean="0"/>
+              <a:t>For </a:t>
+            </a:r>
+            <a:r>
+              <a:rPr lang="en-GB" dirty="0"/>
+              <a:t>processing the data, the Hadoop Map/Reduce ships code (</a:t>
+            </a:r>
+            <a:r>
+              <a:rPr lang="en-GB" dirty="0" err="1"/>
+              <a:t>specificallyJar</a:t>
+            </a:r>
+            <a:r>
+              <a:rPr lang="en-GB" dirty="0"/>
+              <a:t> files) to the nodes that have the required data, and the nodes then process the data in parallel. This approach takes advantage of data locality</a:t>
+            </a:r>
+            <a:r>
+              <a:rPr lang="en-GB" dirty="0" smtClean="0"/>
+              <a:t>, </a:t>
+            </a:r>
+            <a:r>
+              <a:rPr lang="en-GB" dirty="0"/>
+              <a:t>in contrast to conventional HPC architecture which usually relies on a parallel file </a:t>
+            </a:r>
+            <a:r>
+              <a:rPr lang="en-GB" dirty="0" smtClean="0"/>
+              <a:t>system.</a:t>
+            </a:r>
+            <a:endParaRPr lang="en-GB" dirty="0"/>
+          </a:p>
+        </p:txBody>
+      </p:sp>
+      <p:pic>
+        <p:nvPicPr>
+          <p:cNvPr id="4" name="Imagem 3"/>
+          <p:cNvPicPr>
+            <a:picLocks noChangeAspect="1"/>
+          </p:cNvPicPr>
+          <p:nvPr/>
+        </p:nvPicPr>
+        <p:blipFill>
+          <a:blip r:embed="rId2">
+            <a:extLst>
+              <a:ext uri="{28A0092B-C50C-407E-A947-70E740481C1C}">
+                <a14:useLocalDpi xmlns:a14="http://schemas.microsoft.com/office/drawing/2010/main" val="0"/>
+              </a:ext>
+            </a:extLst>
+          </a:blip>
+          <a:stretch>
+            <a:fillRect/>
+          </a:stretch>
+        </p:blipFill>
+        <p:spPr>
+          <a:xfrm>
+            <a:off x="8089900" y="4742486"/>
+            <a:ext cx="3168834" cy="1986571"/>
+          </a:xfrm>
+          <a:prstGeom prst="rect">
+            <a:avLst/>
+          </a:prstGeom>
+        </p:spPr>
+      </p:pic>
+    </p:spTree>
+    <p:extLst>
+      <p:ext uri="{BB962C8B-B14F-4D97-AF65-F5344CB8AC3E}">
+        <p14:creationId xmlns:p14="http://schemas.microsoft.com/office/powerpoint/2010/main" val="3120646289"/>
+      </p:ext>
+    </p:extLst>
+  </p:cSld>
+  <p:clrMapOvr>
+    <a:masterClrMapping/>
+  </p:clrMapOvr>
+  <p:timing>
+    <p:tnLst>
+      <p:par>
+        <p:cTn id="1" dur="indefinite" restart="never" nodeType="tmRoot"/>
+      </p:par>
+    </p:tnLst>
+  </p:timing>
+</p:sld>
+</file>
+
+<file path=ppt/slides/slide8.xml><?xml version="1.0" encoding="utf-8"?>
+<p:sld xmlns:a="http://schemas.openxmlformats.org/drawingml/2006/main" xmlns:r="http://schemas.openxmlformats.org/officeDocument/2006/relationships" xmlns:p="http://schemas.openxmlformats.org/presentationml/2006/main">
+  <p:cSld>
+    <p:spTree>
+      <p:nvGrpSpPr>
+        <p:cNvPr id="1" name=""/>
+        <p:cNvGrpSpPr/>
+        <p:nvPr/>
+      </p:nvGrpSpPr>
+      <p:grpSpPr>
+        <a:xfrm>
+          <a:off x="0" y="0"/>
+          <a:ext cx="0" cy="0"/>
+          <a:chOff x="0" y="0"/>
+          <a:chExt cx="0" cy="0"/>
+        </a:xfrm>
+      </p:grpSpPr>
+      <p:sp>
+        <p:nvSpPr>
+          <p:cNvPr id="2" name="Título 1"/>
+          <p:cNvSpPr>
+            <a:spLocks noGrp="1"/>
+          </p:cNvSpPr>
+          <p:nvPr>
+            <p:ph type="title"/>
+          </p:nvPr>
+        </p:nvSpPr>
+        <p:spPr/>
+        <p:txBody>
+          <a:bodyPr/>
+          <a:lstStyle/>
+          <a:p>
+            <a:r>
+              <a:rPr lang="en-GB" sz="4000" dirty="0"/>
+              <a:t>Known </a:t>
+            </a:r>
+            <a:r>
+              <a:rPr lang="en-GB" sz="4000" dirty="0" err="1"/>
+              <a:t>MapReduce</a:t>
+            </a:r>
+            <a:r>
+              <a:rPr lang="en-GB" sz="4000" dirty="0"/>
+              <a:t> implementations</a:t>
+            </a:r>
+          </a:p>
+        </p:txBody>
+      </p:sp>
+      <p:sp>
+        <p:nvSpPr>
+          <p:cNvPr id="3" name="Marcador de Posição de Conteúdo 2"/>
+          <p:cNvSpPr>
+            <a:spLocks noGrp="1"/>
+          </p:cNvSpPr>
+          <p:nvPr>
+            <p:ph idx="1"/>
+          </p:nvPr>
+        </p:nvSpPr>
+        <p:spPr>
+          <a:xfrm>
+            <a:off x="1281112" y="1853248"/>
+            <a:ext cx="8946541" cy="4195481"/>
+          </a:xfrm>
+        </p:spPr>
+        <p:txBody>
+          <a:bodyPr>
+            <a:normAutofit/>
+          </a:bodyPr>
+          <a:lstStyle/>
+          <a:p>
+            <a:r>
+              <a:rPr lang="pt-PT" dirty="0" err="1" smtClean="0"/>
+              <a:t>Spark</a:t>
+            </a:r>
+            <a:endParaRPr lang="en-GB" dirty="0"/>
+          </a:p>
+          <a:p>
+            <a:pPr lvl="1"/>
+            <a:r>
+              <a:rPr lang="en-GB" dirty="0" smtClean="0"/>
+              <a:t>Nowadays an Apache </a:t>
+            </a:r>
+            <a:r>
+              <a:rPr lang="en-GB" dirty="0"/>
+              <a:t>Incubator </a:t>
+            </a:r>
+            <a:r>
+              <a:rPr lang="en-GB" dirty="0" smtClean="0"/>
+              <a:t>project, defined as "Next-generation</a:t>
+            </a:r>
+            <a:r>
+              <a:rPr lang="en-GB" dirty="0"/>
+              <a:t>" </a:t>
+            </a:r>
+            <a:r>
+              <a:rPr lang="en-GB" dirty="0" smtClean="0"/>
+              <a:t>map/reduce because its </a:t>
+            </a:r>
+            <a:r>
+              <a:rPr lang="en-GB" dirty="0"/>
+              <a:t>designed for </a:t>
+            </a:r>
+            <a:r>
+              <a:rPr lang="en-GB" dirty="0" smtClean="0"/>
+              <a:t>performance and speed.</a:t>
+            </a:r>
+            <a:endParaRPr lang="en-GB" dirty="0"/>
+          </a:p>
+          <a:p>
+            <a:pPr lvl="1"/>
+            <a:r>
+              <a:rPr lang="en-GB" dirty="0" smtClean="0"/>
+              <a:t>Provides high level APIs </a:t>
+            </a:r>
+            <a:r>
+              <a:rPr lang="en-GB" dirty="0"/>
+              <a:t>for Scala, </a:t>
+            </a:r>
+            <a:r>
+              <a:rPr lang="en-GB" dirty="0" smtClean="0"/>
+              <a:t>Java and  Python as well as a rich set of higher-level tools including </a:t>
+            </a:r>
+            <a:r>
+              <a:rPr lang="en-GB" dirty="0"/>
+              <a:t>Shark (SQL</a:t>
+            </a:r>
+            <a:r>
+              <a:rPr lang="en-GB" dirty="0" smtClean="0"/>
+              <a:t>) </a:t>
+            </a:r>
+            <a:r>
+              <a:rPr lang="en-GB" dirty="0"/>
+              <a:t>for SQL and structured data processing</a:t>
+            </a:r>
+            <a:r>
+              <a:rPr lang="en-GB" dirty="0" smtClean="0"/>
+              <a:t>, </a:t>
+            </a:r>
+            <a:r>
+              <a:rPr lang="en-GB" dirty="0" err="1" smtClean="0"/>
+              <a:t>MLlib</a:t>
+            </a:r>
+            <a:r>
+              <a:rPr lang="en-GB" dirty="0" smtClean="0"/>
+              <a:t> for machine learning, </a:t>
+            </a:r>
+            <a:r>
+              <a:rPr lang="en-GB" dirty="0" err="1" smtClean="0"/>
+              <a:t>GraphX</a:t>
+            </a:r>
+            <a:r>
+              <a:rPr lang="en-GB" dirty="0" smtClean="0"/>
+              <a:t> for graph processing and a self-made streaming API(Spark Streaming).</a:t>
+            </a:r>
+            <a:endParaRPr lang="en-GB" dirty="0"/>
+          </a:p>
+        </p:txBody>
+      </p:sp>
+      <p:pic>
+        <p:nvPicPr>
+          <p:cNvPr id="4" name="Imagem 3"/>
+          <p:cNvPicPr>
+            <a:picLocks noChangeAspect="1"/>
+          </p:cNvPicPr>
+          <p:nvPr/>
+        </p:nvPicPr>
+        <p:blipFill>
+          <a:blip r:embed="rId2">
+            <a:extLst>
+              <a:ext uri="{28A0092B-C50C-407E-A947-70E740481C1C}">
+                <a14:useLocalDpi xmlns:a14="http://schemas.microsoft.com/office/drawing/2010/main" val="0"/>
+              </a:ext>
+            </a:extLst>
+          </a:blip>
+          <a:stretch>
+            <a:fillRect/>
+          </a:stretch>
+        </p:blipFill>
+        <p:spPr>
+          <a:xfrm>
+            <a:off x="1409700" y="4577183"/>
+            <a:ext cx="3288952" cy="1651985"/>
+          </a:xfrm>
+          <a:prstGeom prst="rect">
+            <a:avLst/>
+          </a:prstGeom>
+        </p:spPr>
+      </p:pic>
+      <p:pic>
+        <p:nvPicPr>
+          <p:cNvPr id="5" name="Imagem 4"/>
+          <p:cNvPicPr>
+            <a:picLocks noChangeAspect="1"/>
+          </p:cNvPicPr>
+          <p:nvPr/>
+        </p:nvPicPr>
+        <p:blipFill>
+          <a:blip r:embed="rId3">
+            <a:extLst>
+              <a:ext uri="{28A0092B-C50C-407E-A947-70E740481C1C}">
+                <a14:useLocalDpi xmlns:a14="http://schemas.microsoft.com/office/drawing/2010/main" val="0"/>
+              </a:ext>
+            </a:extLst>
+          </a:blip>
+          <a:stretch>
+            <a:fillRect/>
+          </a:stretch>
+        </p:blipFill>
+        <p:spPr>
+          <a:xfrm>
+            <a:off x="6507316" y="4514177"/>
+            <a:ext cx="3858449" cy="1816458"/>
+          </a:xfrm>
+          <a:prstGeom prst="rect">
+            <a:avLst/>
+          </a:prstGeom>
+        </p:spPr>
+      </p:pic>
+    </p:spTree>
+    <p:extLst>
+      <p:ext uri="{BB962C8B-B14F-4D97-AF65-F5344CB8AC3E}">
+        <p14:creationId xmlns:p14="http://schemas.microsoft.com/office/powerpoint/2010/main" val="1661921616"/>
+      </p:ext>
+    </p:extLst>
+  </p:cSld>
+  <p:clrMapOvr>
+    <a:masterClrMapping/>
+  </p:clrMapOvr>
+</p:sld>
+</file>
+
+<file path=ppt/slides/slide9.xml><?xml version="1.0" encoding="utf-8"?>
+<p:sld xmlns:a="http://schemas.openxmlformats.org/drawingml/2006/main" xmlns:r="http://schemas.openxmlformats.org/officeDocument/2006/relationships" xmlns:p="http://schemas.openxmlformats.org/presentationml/2006/main">
+  <p:cSld>
+    <p:spTree>
+      <p:nvGrpSpPr>
+        <p:cNvPr id="1" name=""/>
+        <p:cNvGrpSpPr/>
+        <p:nvPr/>
+      </p:nvGrpSpPr>
+      <p:grpSpPr>
+        <a:xfrm>
+          <a:off x="0" y="0"/>
+          <a:ext cx="0" cy="0"/>
+          <a:chOff x="0" y="0"/>
+          <a:chExt cx="0" cy="0"/>
+        </a:xfrm>
+      </p:grpSpPr>
+      <p:sp>
+        <p:nvSpPr>
+          <p:cNvPr id="2" name="Título 1"/>
+          <p:cNvSpPr>
+            <a:spLocks noGrp="1"/>
+          </p:cNvSpPr>
+          <p:nvPr>
+            <p:ph type="title"/>
+          </p:nvPr>
+        </p:nvSpPr>
+        <p:spPr/>
+        <p:txBody>
+          <a:bodyPr/>
+          <a:lstStyle/>
+          <a:p>
+            <a:pPr algn="ctr"/>
+            <a:r>
+              <a:rPr lang="pt-PT" dirty="0" err="1" smtClean="0"/>
+              <a:t>Practical</a:t>
+            </a:r>
+            <a:r>
+              <a:rPr lang="pt-PT" dirty="0" smtClean="0"/>
+              <a:t> </a:t>
+            </a:r>
+            <a:r>
+              <a:rPr lang="pt-PT" dirty="0" err="1" smtClean="0"/>
+              <a:t>example</a:t>
+            </a:r>
+            <a:endParaRPr lang="en-GB" dirty="0"/>
+          </a:p>
+        </p:txBody>
+      </p:sp>
+      <p:sp>
+        <p:nvSpPr>
+          <p:cNvPr id="5" name="CaixaDeTexto 4"/>
+          <p:cNvSpPr txBox="1"/>
+          <p:nvPr/>
+        </p:nvSpPr>
+        <p:spPr>
+          <a:xfrm>
+            <a:off x="7537983" y="2122854"/>
+            <a:ext cx="3378200" cy="1200329"/>
+          </a:xfrm>
+          <a:prstGeom prst="rect">
+            <a:avLst/>
+          </a:prstGeom>
+          <a:noFill/>
+        </p:spPr>
+        <p:txBody>
+          <a:bodyPr wrap="square" rtlCol="0">
+            <a:spAutoFit/>
+          </a:bodyPr>
+          <a:lstStyle/>
+          <a:p>
+            <a:r>
+              <a:rPr lang="pt-PT" dirty="0" err="1"/>
+              <a:t>M</a:t>
+            </a:r>
+            <a:r>
+              <a:rPr lang="pt-PT" dirty="0" err="1" smtClean="0"/>
+              <a:t>apping</a:t>
+            </a:r>
+            <a:r>
+              <a:rPr lang="pt-PT" dirty="0" smtClean="0"/>
+              <a:t> </a:t>
+            </a:r>
+            <a:r>
+              <a:rPr lang="pt-PT" dirty="0" err="1" smtClean="0"/>
+              <a:t>the</a:t>
+            </a:r>
+            <a:r>
+              <a:rPr lang="pt-PT" dirty="0" smtClean="0"/>
+              <a:t> </a:t>
+            </a:r>
+            <a:r>
+              <a:rPr lang="pt-PT" dirty="0" err="1" smtClean="0"/>
+              <a:t>number</a:t>
+            </a:r>
+            <a:r>
+              <a:rPr lang="pt-PT" dirty="0" smtClean="0"/>
+              <a:t> </a:t>
+            </a:r>
+            <a:r>
+              <a:rPr lang="pt-PT" dirty="0" err="1" smtClean="0"/>
+              <a:t>of</a:t>
+            </a:r>
+            <a:r>
+              <a:rPr lang="pt-PT" dirty="0" smtClean="0"/>
+              <a:t> </a:t>
+            </a:r>
+            <a:r>
+              <a:rPr lang="pt-PT" dirty="0" err="1" smtClean="0"/>
+              <a:t>occurrences</a:t>
+            </a:r>
+            <a:r>
+              <a:rPr lang="pt-PT" dirty="0" smtClean="0"/>
+              <a:t> </a:t>
+            </a:r>
+            <a:r>
+              <a:rPr lang="pt-PT" dirty="0" err="1" smtClean="0"/>
+              <a:t>of</a:t>
+            </a:r>
+            <a:r>
+              <a:rPr lang="pt-PT" dirty="0" smtClean="0"/>
+              <a:t> a </a:t>
+            </a:r>
+            <a:r>
+              <a:rPr lang="pt-PT" dirty="0" err="1" smtClean="0"/>
+              <a:t>certain</a:t>
+            </a:r>
+            <a:r>
+              <a:rPr lang="pt-PT" dirty="0" smtClean="0"/>
+              <a:t> </a:t>
+            </a:r>
+            <a:r>
+              <a:rPr lang="pt-PT" dirty="0" err="1" smtClean="0"/>
+              <a:t>word</a:t>
+            </a:r>
+            <a:r>
+              <a:rPr lang="pt-PT" dirty="0" smtClean="0"/>
+              <a:t> in a </a:t>
+            </a:r>
+            <a:r>
+              <a:rPr lang="pt-PT" dirty="0" err="1" smtClean="0"/>
+              <a:t>collection</a:t>
+            </a:r>
+            <a:r>
+              <a:rPr lang="pt-PT" dirty="0" smtClean="0"/>
+              <a:t> </a:t>
+            </a:r>
+            <a:r>
+              <a:rPr lang="pt-PT" dirty="0" err="1" smtClean="0"/>
+              <a:t>of</a:t>
+            </a:r>
+            <a:r>
+              <a:rPr lang="pt-PT" dirty="0" smtClean="0"/>
+              <a:t> </a:t>
+            </a:r>
+            <a:r>
+              <a:rPr lang="pt-PT" dirty="0" err="1" smtClean="0"/>
+              <a:t>books</a:t>
+            </a:r>
+            <a:r>
+              <a:rPr lang="pt-PT" dirty="0" smtClean="0"/>
+              <a:t>.</a:t>
+            </a:r>
+            <a:endParaRPr lang="en-GB" dirty="0"/>
+          </a:p>
+        </p:txBody>
+      </p:sp>
+      <p:pic>
+        <p:nvPicPr>
+          <p:cNvPr id="8" name="Marcador de Posição de Conteúdo 7"/>
+          <p:cNvPicPr>
+            <a:picLocks noGrp="1" noChangeAspect="1"/>
+          </p:cNvPicPr>
+          <p:nvPr>
+            <p:ph idx="1"/>
+          </p:nvPr>
+        </p:nvPicPr>
+        <p:blipFill>
+          <a:blip r:embed="rId2">
+            <a:extLst>
+              <a:ext uri="{28A0092B-C50C-407E-A947-70E740481C1C}">
+                <a14:useLocalDpi xmlns:a14="http://schemas.microsoft.com/office/drawing/2010/main" val="0"/>
+              </a:ext>
+            </a:extLst>
+          </a:blip>
+          <a:stretch>
+            <a:fillRect/>
+          </a:stretch>
+        </p:blipFill>
+        <p:spPr>
+          <a:xfrm>
+            <a:off x="1282700" y="1768714"/>
+            <a:ext cx="5988583" cy="4491438"/>
+          </a:xfrm>
+        </p:spPr>
+      </p:pic>
+    </p:spTree>
+    <p:extLst>
+      <p:ext uri="{BB962C8B-B14F-4D97-AF65-F5344CB8AC3E}">
+        <p14:creationId xmlns:p14="http://schemas.microsoft.com/office/powerpoint/2010/main" val="2522475347"/>
       </p:ext>
     </p:extLst>
   </p:cSld>

</xml_diff>

<commit_message>
:8ball: :+1: :-1: :accept: :-1: :+1: :8ball:
Monaderino
</commit_message>
<xml_diff>
--- a/PPTESOF.pptx
+++ b/PPTESOF.pptx
@@ -11,12 +11,13 @@
     <p:sldId id="262" r:id="rId5"/>
     <p:sldId id="258" r:id="rId6"/>
     <p:sldId id="259" r:id="rId7"/>
-    <p:sldId id="265" r:id="rId8"/>
-    <p:sldId id="266" r:id="rId9"/>
-    <p:sldId id="260" r:id="rId10"/>
-    <p:sldId id="261" r:id="rId11"/>
-    <p:sldId id="267" r:id="rId12"/>
-    <p:sldId id="264" r:id="rId13"/>
+    <p:sldId id="268" r:id="rId8"/>
+    <p:sldId id="265" r:id="rId9"/>
+    <p:sldId id="266" r:id="rId10"/>
+    <p:sldId id="260" r:id="rId11"/>
+    <p:sldId id="261" r:id="rId12"/>
+    <p:sldId id="267" r:id="rId13"/>
+    <p:sldId id="264" r:id="rId14"/>
   </p:sldIdLst>
   <p:sldSz cx="12192000" cy="6858000"/>
   <p:notesSz cx="6858000" cy="9144000"/>
@@ -6191,6 +6192,222 @@
             <a:pPr algn="ctr"/>
             <a:r>
               <a:rPr lang="pt-PT" dirty="0" err="1" smtClean="0"/>
+              <a:t>Practical</a:t>
+            </a:r>
+            <a:r>
+              <a:rPr lang="pt-PT" dirty="0" smtClean="0"/>
+              <a:t> </a:t>
+            </a:r>
+            <a:r>
+              <a:rPr lang="pt-PT" dirty="0" err="1" smtClean="0"/>
+              <a:t>example</a:t>
+            </a:r>
+            <a:endParaRPr lang="en-GB" dirty="0"/>
+          </a:p>
+        </p:txBody>
+      </p:sp>
+      <p:sp>
+        <p:nvSpPr>
+          <p:cNvPr id="5" name="CaixaDeTexto 4"/>
+          <p:cNvSpPr txBox="1"/>
+          <p:nvPr/>
+        </p:nvSpPr>
+        <p:spPr>
+          <a:xfrm>
+            <a:off x="7537983" y="2122854"/>
+            <a:ext cx="3378200" cy="1200329"/>
+          </a:xfrm>
+          <a:prstGeom prst="rect">
+            <a:avLst/>
+          </a:prstGeom>
+          <a:noFill/>
+        </p:spPr>
+        <p:txBody>
+          <a:bodyPr wrap="square" rtlCol="0">
+            <a:spAutoFit/>
+          </a:bodyPr>
+          <a:lstStyle/>
+          <a:p>
+            <a:r>
+              <a:rPr lang="pt-PT" dirty="0" err="1"/>
+              <a:t>M</a:t>
+            </a:r>
+            <a:r>
+              <a:rPr lang="pt-PT" dirty="0" err="1" smtClean="0"/>
+              <a:t>apping</a:t>
+            </a:r>
+            <a:r>
+              <a:rPr lang="pt-PT" dirty="0" smtClean="0"/>
+              <a:t> </a:t>
+            </a:r>
+            <a:r>
+              <a:rPr lang="pt-PT" dirty="0" err="1" smtClean="0"/>
+              <a:t>the</a:t>
+            </a:r>
+            <a:r>
+              <a:rPr lang="pt-PT" dirty="0" smtClean="0"/>
+              <a:t> </a:t>
+            </a:r>
+            <a:r>
+              <a:rPr lang="pt-PT" dirty="0" err="1" smtClean="0"/>
+              <a:t>number</a:t>
+            </a:r>
+            <a:r>
+              <a:rPr lang="pt-PT" dirty="0" smtClean="0"/>
+              <a:t> </a:t>
+            </a:r>
+            <a:r>
+              <a:rPr lang="pt-PT" dirty="0" err="1" smtClean="0"/>
+              <a:t>of</a:t>
+            </a:r>
+            <a:r>
+              <a:rPr lang="pt-PT" dirty="0" smtClean="0"/>
+              <a:t> </a:t>
+            </a:r>
+            <a:r>
+              <a:rPr lang="pt-PT" dirty="0" err="1" smtClean="0"/>
+              <a:t>occurrences</a:t>
+            </a:r>
+            <a:r>
+              <a:rPr lang="pt-PT" dirty="0" smtClean="0"/>
+              <a:t> </a:t>
+            </a:r>
+            <a:r>
+              <a:rPr lang="pt-PT" dirty="0" err="1" smtClean="0"/>
+              <a:t>of</a:t>
+            </a:r>
+            <a:r>
+              <a:rPr lang="pt-PT" dirty="0" smtClean="0"/>
+              <a:t> a </a:t>
+            </a:r>
+            <a:r>
+              <a:rPr lang="pt-PT" dirty="0" err="1" smtClean="0"/>
+              <a:t>certain</a:t>
+            </a:r>
+            <a:r>
+              <a:rPr lang="pt-PT" dirty="0" smtClean="0"/>
+              <a:t> </a:t>
+            </a:r>
+            <a:r>
+              <a:rPr lang="pt-PT" dirty="0" err="1" smtClean="0"/>
+              <a:t>word</a:t>
+            </a:r>
+            <a:r>
+              <a:rPr lang="pt-PT" dirty="0" smtClean="0"/>
+              <a:t> in a </a:t>
+            </a:r>
+            <a:r>
+              <a:rPr lang="pt-PT" dirty="0" err="1" smtClean="0"/>
+              <a:t>collection</a:t>
+            </a:r>
+            <a:r>
+              <a:rPr lang="pt-PT" dirty="0" smtClean="0"/>
+              <a:t> </a:t>
+            </a:r>
+            <a:r>
+              <a:rPr lang="pt-PT" dirty="0" err="1" smtClean="0"/>
+              <a:t>of</a:t>
+            </a:r>
+            <a:r>
+              <a:rPr lang="pt-PT" dirty="0" smtClean="0"/>
+              <a:t> </a:t>
+            </a:r>
+            <a:r>
+              <a:rPr lang="pt-PT" dirty="0" err="1" smtClean="0"/>
+              <a:t>books</a:t>
+            </a:r>
+            <a:r>
+              <a:rPr lang="pt-PT" dirty="0" smtClean="0"/>
+              <a:t>.</a:t>
+            </a:r>
+            <a:endParaRPr lang="en-GB" dirty="0"/>
+          </a:p>
+        </p:txBody>
+      </p:sp>
+      <p:pic>
+        <p:nvPicPr>
+          <p:cNvPr id="8" name="Marcador de Posição de Conteúdo 7"/>
+          <p:cNvPicPr>
+            <a:picLocks noGrp="1" noChangeAspect="1"/>
+          </p:cNvPicPr>
+          <p:nvPr>
+            <p:ph idx="1"/>
+          </p:nvPr>
+        </p:nvPicPr>
+        <p:blipFill>
+          <a:blip r:embed="rId2">
+            <a:extLst>
+              <a:ext uri="{28A0092B-C50C-407E-A947-70E740481C1C}">
+                <a14:useLocalDpi xmlns:a14="http://schemas.microsoft.com/office/drawing/2010/main" val="0"/>
+              </a:ext>
+            </a:extLst>
+          </a:blip>
+          <a:stretch>
+            <a:fillRect/>
+          </a:stretch>
+        </p:blipFill>
+        <p:spPr>
+          <a:xfrm>
+            <a:off x="1282700" y="1768714"/>
+            <a:ext cx="5988583" cy="4491438"/>
+          </a:xfrm>
+        </p:spPr>
+      </p:pic>
+    </p:spTree>
+    <p:extLst>
+      <p:ext uri="{BB962C8B-B14F-4D97-AF65-F5344CB8AC3E}">
+        <p14:creationId xmlns:p14="http://schemas.microsoft.com/office/powerpoint/2010/main" val="2522475347"/>
+      </p:ext>
+    </p:extLst>
+  </p:cSld>
+  <p:clrMapOvr>
+    <a:masterClrMapping/>
+  </p:clrMapOvr>
+  <p:timing>
+    <p:tnLst>
+      <p:par>
+        <p:cTn id="1" dur="indefinite" restart="never" nodeType="tmRoot"/>
+      </p:par>
+    </p:tnLst>
+  </p:timing>
+</p:sld>
+</file>
+
+<file path=ppt/slides/slide11.xml><?xml version="1.0" encoding="utf-8"?>
+<p:sld xmlns:a="http://schemas.openxmlformats.org/drawingml/2006/main" xmlns:r="http://schemas.openxmlformats.org/officeDocument/2006/relationships" xmlns:p="http://schemas.openxmlformats.org/presentationml/2006/main">
+  <p:cSld>
+    <p:spTree>
+      <p:nvGrpSpPr>
+        <p:cNvPr id="1" name=""/>
+        <p:cNvGrpSpPr/>
+        <p:nvPr/>
+      </p:nvGrpSpPr>
+      <p:grpSpPr>
+        <a:xfrm>
+          <a:off x="0" y="0"/>
+          <a:ext cx="0" cy="0"/>
+          <a:chOff x="0" y="0"/>
+          <a:chExt cx="0" cy="0"/>
+        </a:xfrm>
+      </p:grpSpPr>
+      <p:sp>
+        <p:nvSpPr>
+          <p:cNvPr id="2" name="Título 1"/>
+          <p:cNvSpPr>
+            <a:spLocks noGrp="1"/>
+          </p:cNvSpPr>
+          <p:nvPr>
+            <p:ph type="title"/>
+          </p:nvPr>
+        </p:nvSpPr>
+        <p:spPr/>
+        <p:txBody>
+          <a:bodyPr/>
+          <a:lstStyle/>
+          <a:p>
+            <a:pPr algn="ctr"/>
+            <a:r>
+              <a:rPr lang="pt-PT" dirty="0" err="1" smtClean="0"/>
               <a:t>Pseudo-coded</a:t>
             </a:r>
             <a:r>
@@ -6284,7 +6501,7 @@
 </p:sld>
 </file>
 
-<file path=ppt/slides/slide11.xml><?xml version="1.0" encoding="utf-8"?>
+<file path=ppt/slides/slide12.xml><?xml version="1.0" encoding="utf-8"?>
 <p:sld xmlns:a="http://schemas.openxmlformats.org/drawingml/2006/main" xmlns:r="http://schemas.openxmlformats.org/officeDocument/2006/relationships" xmlns:p="http://schemas.openxmlformats.org/presentationml/2006/main">
   <p:cSld>
     <p:spTree>
@@ -6401,7 +6618,7 @@
 </p:sld>
 </file>
 
-<file path=ppt/slides/slide12.xml><?xml version="1.0" encoding="utf-8"?>
+<file path=ppt/slides/slide13.xml><?xml version="1.0" encoding="utf-8"?>
 <p:sld xmlns:a="http://schemas.openxmlformats.org/drawingml/2006/main" xmlns:r="http://schemas.openxmlformats.org/officeDocument/2006/relationships" xmlns:p="http://schemas.openxmlformats.org/presentationml/2006/main">
   <p:cSld>
     <p:spTree>
@@ -7774,6 +7991,206 @@
           <a:bodyPr/>
           <a:lstStyle/>
           <a:p>
+            <a:pPr algn="ctr"/>
+            <a:r>
+              <a:rPr lang="pt-PT" dirty="0" err="1" smtClean="0"/>
+              <a:t>Monad</a:t>
+            </a:r>
+            <a:endParaRPr lang="en-GB" dirty="0"/>
+          </a:p>
+        </p:txBody>
+      </p:sp>
+      <p:sp>
+        <p:nvSpPr>
+          <p:cNvPr id="3" name="Marcador de Posição de Conteúdo 2"/>
+          <p:cNvSpPr>
+            <a:spLocks noGrp="1"/>
+          </p:cNvSpPr>
+          <p:nvPr>
+            <p:ph idx="1"/>
+          </p:nvPr>
+        </p:nvSpPr>
+        <p:spPr/>
+        <p:txBody>
+          <a:bodyPr>
+            <a:normAutofit/>
+          </a:bodyPr>
+          <a:lstStyle/>
+          <a:p>
+            <a:r>
+              <a:rPr lang="en-GB" dirty="0"/>
+              <a:t>M</a:t>
+            </a:r>
+            <a:r>
+              <a:rPr lang="en-GB" dirty="0" smtClean="0"/>
+              <a:t>onads </a:t>
+            </a:r>
+            <a:r>
+              <a:rPr lang="en-GB" dirty="0"/>
+              <a:t>are a language feature </a:t>
+            </a:r>
+            <a:r>
+              <a:rPr lang="en-GB" dirty="0" smtClean="0"/>
+              <a:t>that allow </a:t>
+            </a:r>
+            <a:r>
+              <a:rPr lang="en-GB" dirty="0"/>
+              <a:t>the definition of language-integrated DSLs in a way </a:t>
+            </a:r>
+            <a:r>
+              <a:rPr lang="en-GB" dirty="0" smtClean="0"/>
+              <a:t>where semantic </a:t>
+            </a:r>
+            <a:r>
+              <a:rPr lang="en-GB" dirty="0"/>
+              <a:t>peculiarities are abstracted away from the syntactic interface</a:t>
+            </a:r>
+            <a:r>
+              <a:rPr lang="en-GB" dirty="0" smtClean="0"/>
+              <a:t>.</a:t>
+            </a:r>
+            <a:endParaRPr lang="en-GB" dirty="0"/>
+          </a:p>
+          <a:p>
+            <a:r>
+              <a:rPr lang="en-GB" dirty="0" smtClean="0"/>
+              <a:t>It was found </a:t>
+            </a:r>
+            <a:r>
+              <a:rPr lang="en-GB" dirty="0"/>
+              <a:t>that </a:t>
+            </a:r>
+            <a:r>
+              <a:rPr lang="en-GB" dirty="0" err="1"/>
+              <a:t>MapReduce</a:t>
+            </a:r>
+            <a:r>
+              <a:rPr lang="en-GB" dirty="0"/>
+              <a:t> can be expressed naturally, using functional programming techniques, as a form of </a:t>
+            </a:r>
+            <a:r>
+              <a:rPr lang="en-GB" dirty="0" smtClean="0"/>
+              <a:t>monad.  The basic idea is to convert each </a:t>
+            </a:r>
+            <a:r>
+              <a:rPr lang="en-GB" dirty="0"/>
+              <a:t>map / reduce stage into a monadic function, so </a:t>
+            </a:r>
+            <a:r>
+              <a:rPr lang="en-GB" dirty="0" err="1"/>
+              <a:t>MapReduce</a:t>
+            </a:r>
+            <a:r>
+              <a:rPr lang="en-GB" dirty="0"/>
+              <a:t> becomes a composition:</a:t>
+            </a:r>
+          </a:p>
+          <a:p>
+            <a:r>
+              <a:rPr lang="en-GB" dirty="0" smtClean="0"/>
+              <a:t>Monads </a:t>
+            </a:r>
+            <a:r>
+              <a:rPr lang="en-GB" dirty="0"/>
+              <a:t>have known success in languages such as </a:t>
+            </a:r>
+            <a:r>
+              <a:rPr lang="en-GB" dirty="0" smtClean="0"/>
+              <a:t>Haskell, Scala </a:t>
+            </a:r>
+            <a:r>
+              <a:rPr lang="en-GB" dirty="0"/>
+              <a:t>and </a:t>
+            </a:r>
+            <a:r>
+              <a:rPr lang="en-GB" dirty="0" err="1" smtClean="0"/>
+              <a:t>Clojure</a:t>
+            </a:r>
+            <a:r>
+              <a:rPr lang="en-GB" dirty="0" smtClean="0"/>
+              <a:t>.</a:t>
+            </a:r>
+          </a:p>
+          <a:p>
+            <a:endParaRPr lang="en-GB" dirty="0"/>
+          </a:p>
+        </p:txBody>
+      </p:sp>
+      <p:pic>
+        <p:nvPicPr>
+          <p:cNvPr id="4" name="Imagem 3"/>
+          <p:cNvPicPr>
+            <a:picLocks noChangeAspect="1"/>
+          </p:cNvPicPr>
+          <p:nvPr/>
+        </p:nvPicPr>
+        <p:blipFill>
+          <a:blip r:embed="rId2">
+            <a:extLst>
+              <a:ext uri="{28A0092B-C50C-407E-A947-70E740481C1C}">
+                <a14:useLocalDpi xmlns:a14="http://schemas.microsoft.com/office/drawing/2010/main" val="0"/>
+              </a:ext>
+            </a:extLst>
+          </a:blip>
+          <a:stretch>
+            <a:fillRect/>
+          </a:stretch>
+        </p:blipFill>
+        <p:spPr>
+          <a:xfrm>
+            <a:off x="3953214" y="4937030"/>
+            <a:ext cx="6676686" cy="1511039"/>
+          </a:xfrm>
+          <a:prstGeom prst="rect">
+            <a:avLst/>
+          </a:prstGeom>
+        </p:spPr>
+      </p:pic>
+    </p:spTree>
+    <p:extLst>
+      <p:ext uri="{BB962C8B-B14F-4D97-AF65-F5344CB8AC3E}">
+        <p14:creationId xmlns:p14="http://schemas.microsoft.com/office/powerpoint/2010/main" val="2583901647"/>
+      </p:ext>
+    </p:extLst>
+  </p:cSld>
+  <p:clrMapOvr>
+    <a:masterClrMapping/>
+  </p:clrMapOvr>
+</p:sld>
+</file>
+
+<file path=ppt/slides/slide8.xml><?xml version="1.0" encoding="utf-8"?>
+<p:sld xmlns:a="http://schemas.openxmlformats.org/drawingml/2006/main" xmlns:r="http://schemas.openxmlformats.org/officeDocument/2006/relationships" xmlns:p="http://schemas.openxmlformats.org/presentationml/2006/main">
+  <p:cSld>
+    <p:spTree>
+      <p:nvGrpSpPr>
+        <p:cNvPr id="1" name=""/>
+        <p:cNvGrpSpPr/>
+        <p:nvPr/>
+      </p:nvGrpSpPr>
+      <p:grpSpPr>
+        <a:xfrm>
+          <a:off x="0" y="0"/>
+          <a:ext cx="0" cy="0"/>
+          <a:chOff x="0" y="0"/>
+          <a:chExt cx="0" cy="0"/>
+        </a:xfrm>
+      </p:grpSpPr>
+      <p:sp>
+        <p:nvSpPr>
+          <p:cNvPr id="2" name="Título 1"/>
+          <p:cNvSpPr>
+            <a:spLocks noGrp="1"/>
+          </p:cNvSpPr>
+          <p:nvPr>
+            <p:ph type="title"/>
+          </p:nvPr>
+        </p:nvSpPr>
+        <p:spPr/>
+        <p:txBody>
+          <a:bodyPr/>
+          <a:lstStyle/>
+          <a:p>
             <a:r>
               <a:rPr lang="pt-PT" sz="4000" dirty="0" err="1" smtClean="0"/>
               <a:t>Known</a:t>
@@ -7934,7 +8351,7 @@
 </p:sld>
 </file>
 
-<file path=ppt/slides/slide8.xml><?xml version="1.0" encoding="utf-8"?>
+<file path=ppt/slides/slide9.xml><?xml version="1.0" encoding="utf-8"?>
 <p:sld xmlns:a="http://schemas.openxmlformats.org/drawingml/2006/main" xmlns:r="http://schemas.openxmlformats.org/officeDocument/2006/relationships" xmlns:p="http://schemas.openxmlformats.org/presentationml/2006/main">
   <p:cSld>
     <p:spTree>
@@ -8161,222 +8578,6 @@
   <p:clrMapOvr>
     <a:masterClrMapping/>
   </p:clrMapOvr>
-</p:sld>
-</file>
-
-<file path=ppt/slides/slide9.xml><?xml version="1.0" encoding="utf-8"?>
-<p:sld xmlns:a="http://schemas.openxmlformats.org/drawingml/2006/main" xmlns:r="http://schemas.openxmlformats.org/officeDocument/2006/relationships" xmlns:p="http://schemas.openxmlformats.org/presentationml/2006/main">
-  <p:cSld>
-    <p:spTree>
-      <p:nvGrpSpPr>
-        <p:cNvPr id="1" name=""/>
-        <p:cNvGrpSpPr/>
-        <p:nvPr/>
-      </p:nvGrpSpPr>
-      <p:grpSpPr>
-        <a:xfrm>
-          <a:off x="0" y="0"/>
-          <a:ext cx="0" cy="0"/>
-          <a:chOff x="0" y="0"/>
-          <a:chExt cx="0" cy="0"/>
-        </a:xfrm>
-      </p:grpSpPr>
-      <p:sp>
-        <p:nvSpPr>
-          <p:cNvPr id="2" name="Título 1"/>
-          <p:cNvSpPr>
-            <a:spLocks noGrp="1"/>
-          </p:cNvSpPr>
-          <p:nvPr>
-            <p:ph type="title"/>
-          </p:nvPr>
-        </p:nvSpPr>
-        <p:spPr/>
-        <p:txBody>
-          <a:bodyPr/>
-          <a:lstStyle/>
-          <a:p>
-            <a:pPr algn="ctr"/>
-            <a:r>
-              <a:rPr lang="pt-PT" dirty="0" err="1" smtClean="0"/>
-              <a:t>Practical</a:t>
-            </a:r>
-            <a:r>
-              <a:rPr lang="pt-PT" dirty="0" smtClean="0"/>
-              <a:t> </a:t>
-            </a:r>
-            <a:r>
-              <a:rPr lang="pt-PT" dirty="0" err="1" smtClean="0"/>
-              <a:t>example</a:t>
-            </a:r>
-            <a:endParaRPr lang="en-GB" dirty="0"/>
-          </a:p>
-        </p:txBody>
-      </p:sp>
-      <p:sp>
-        <p:nvSpPr>
-          <p:cNvPr id="5" name="CaixaDeTexto 4"/>
-          <p:cNvSpPr txBox="1"/>
-          <p:nvPr/>
-        </p:nvSpPr>
-        <p:spPr>
-          <a:xfrm>
-            <a:off x="7537983" y="2122854"/>
-            <a:ext cx="3378200" cy="1200329"/>
-          </a:xfrm>
-          <a:prstGeom prst="rect">
-            <a:avLst/>
-          </a:prstGeom>
-          <a:noFill/>
-        </p:spPr>
-        <p:txBody>
-          <a:bodyPr wrap="square" rtlCol="0">
-            <a:spAutoFit/>
-          </a:bodyPr>
-          <a:lstStyle/>
-          <a:p>
-            <a:r>
-              <a:rPr lang="pt-PT" dirty="0" err="1"/>
-              <a:t>M</a:t>
-            </a:r>
-            <a:r>
-              <a:rPr lang="pt-PT" dirty="0" err="1" smtClean="0"/>
-              <a:t>apping</a:t>
-            </a:r>
-            <a:r>
-              <a:rPr lang="pt-PT" dirty="0" smtClean="0"/>
-              <a:t> </a:t>
-            </a:r>
-            <a:r>
-              <a:rPr lang="pt-PT" dirty="0" err="1" smtClean="0"/>
-              <a:t>the</a:t>
-            </a:r>
-            <a:r>
-              <a:rPr lang="pt-PT" dirty="0" smtClean="0"/>
-              <a:t> </a:t>
-            </a:r>
-            <a:r>
-              <a:rPr lang="pt-PT" dirty="0" err="1" smtClean="0"/>
-              <a:t>number</a:t>
-            </a:r>
-            <a:r>
-              <a:rPr lang="pt-PT" dirty="0" smtClean="0"/>
-              <a:t> </a:t>
-            </a:r>
-            <a:r>
-              <a:rPr lang="pt-PT" dirty="0" err="1" smtClean="0"/>
-              <a:t>of</a:t>
-            </a:r>
-            <a:r>
-              <a:rPr lang="pt-PT" dirty="0" smtClean="0"/>
-              <a:t> </a:t>
-            </a:r>
-            <a:r>
-              <a:rPr lang="pt-PT" dirty="0" err="1" smtClean="0"/>
-              <a:t>occurrences</a:t>
-            </a:r>
-            <a:r>
-              <a:rPr lang="pt-PT" dirty="0" smtClean="0"/>
-              <a:t> </a:t>
-            </a:r>
-            <a:r>
-              <a:rPr lang="pt-PT" dirty="0" err="1" smtClean="0"/>
-              <a:t>of</a:t>
-            </a:r>
-            <a:r>
-              <a:rPr lang="pt-PT" dirty="0" smtClean="0"/>
-              <a:t> a </a:t>
-            </a:r>
-            <a:r>
-              <a:rPr lang="pt-PT" dirty="0" err="1" smtClean="0"/>
-              <a:t>certain</a:t>
-            </a:r>
-            <a:r>
-              <a:rPr lang="pt-PT" dirty="0" smtClean="0"/>
-              <a:t> </a:t>
-            </a:r>
-            <a:r>
-              <a:rPr lang="pt-PT" dirty="0" err="1" smtClean="0"/>
-              <a:t>word</a:t>
-            </a:r>
-            <a:r>
-              <a:rPr lang="pt-PT" dirty="0" smtClean="0"/>
-              <a:t> in a </a:t>
-            </a:r>
-            <a:r>
-              <a:rPr lang="pt-PT" dirty="0" err="1" smtClean="0"/>
-              <a:t>collection</a:t>
-            </a:r>
-            <a:r>
-              <a:rPr lang="pt-PT" dirty="0" smtClean="0"/>
-              <a:t> </a:t>
-            </a:r>
-            <a:r>
-              <a:rPr lang="pt-PT" dirty="0" err="1" smtClean="0"/>
-              <a:t>of</a:t>
-            </a:r>
-            <a:r>
-              <a:rPr lang="pt-PT" dirty="0" smtClean="0"/>
-              <a:t> </a:t>
-            </a:r>
-            <a:r>
-              <a:rPr lang="pt-PT" dirty="0" err="1" smtClean="0"/>
-              <a:t>books</a:t>
-            </a:r>
-            <a:r>
-              <a:rPr lang="pt-PT" dirty="0" smtClean="0"/>
-              <a:t>.</a:t>
-            </a:r>
-            <a:endParaRPr lang="en-GB" dirty="0"/>
-          </a:p>
-        </p:txBody>
-      </p:sp>
-      <p:pic>
-        <p:nvPicPr>
-          <p:cNvPr id="8" name="Marcador de Posição de Conteúdo 7"/>
-          <p:cNvPicPr>
-            <a:picLocks noGrp="1" noChangeAspect="1"/>
-          </p:cNvPicPr>
-          <p:nvPr>
-            <p:ph idx="1"/>
-          </p:nvPr>
-        </p:nvPicPr>
-        <p:blipFill>
-          <a:blip r:embed="rId2">
-            <a:extLst>
-              <a:ext uri="{28A0092B-C50C-407E-A947-70E740481C1C}">
-                <a14:useLocalDpi xmlns:a14="http://schemas.microsoft.com/office/drawing/2010/main" val="0"/>
-              </a:ext>
-            </a:extLst>
-          </a:blip>
-          <a:stretch>
-            <a:fillRect/>
-          </a:stretch>
-        </p:blipFill>
-        <p:spPr>
-          <a:xfrm>
-            <a:off x="1282700" y="1768714"/>
-            <a:ext cx="5988583" cy="4491438"/>
-          </a:xfrm>
-        </p:spPr>
-      </p:pic>
-    </p:spTree>
-    <p:extLst>
-      <p:ext uri="{BB962C8B-B14F-4D97-AF65-F5344CB8AC3E}">
-        <p14:creationId xmlns:p14="http://schemas.microsoft.com/office/powerpoint/2010/main" val="2522475347"/>
-      </p:ext>
-    </p:extLst>
-  </p:cSld>
-  <p:clrMapOvr>
-    <a:masterClrMapping/>
-  </p:clrMapOvr>
-  <p:timing>
-    <p:tnLst>
-      <p:par>
-        <p:cTn id="1" dur="indefinite" restart="never" nodeType="tmRoot"/>
-      </p:par>
-    </p:tnLst>
-  </p:timing>
 </p:sld>
 </file>
 

</xml_diff>